<commit_message>
Mise à jour du pptx de la soutenance finale
</commit_message>
<xml_diff>
--- a/doc/Présentations/Projet Courchevel - Soutenance finale.pptx
+++ b/doc/Présentations/Projet Courchevel - Soutenance finale.pptx
@@ -5,7 +5,7 @@
     <p:sldMasterId id="2147483648" r:id="rId1"/>
   </p:sldMasterIdLst>
   <p:notesMasterIdLst>
-    <p:notesMasterId r:id="rId21"/>
+    <p:notesMasterId r:id="rId22"/>
   </p:notesMasterIdLst>
   <p:sldIdLst>
     <p:sldId id="257" r:id="rId2"/>
@@ -16,17 +16,18 @@
     <p:sldId id="318" r:id="rId7"/>
     <p:sldId id="329" r:id="rId8"/>
     <p:sldId id="330" r:id="rId9"/>
-    <p:sldId id="319" r:id="rId10"/>
-    <p:sldId id="323" r:id="rId11"/>
-    <p:sldId id="324" r:id="rId12"/>
-    <p:sldId id="325" r:id="rId13"/>
-    <p:sldId id="326" r:id="rId14"/>
-    <p:sldId id="320" r:id="rId15"/>
-    <p:sldId id="322" r:id="rId16"/>
-    <p:sldId id="321" r:id="rId17"/>
-    <p:sldId id="316" r:id="rId18"/>
-    <p:sldId id="315" r:id="rId19"/>
-    <p:sldId id="313" r:id="rId20"/>
+    <p:sldId id="331" r:id="rId10"/>
+    <p:sldId id="319" r:id="rId11"/>
+    <p:sldId id="323" r:id="rId12"/>
+    <p:sldId id="324" r:id="rId13"/>
+    <p:sldId id="325" r:id="rId14"/>
+    <p:sldId id="326" r:id="rId15"/>
+    <p:sldId id="320" r:id="rId16"/>
+    <p:sldId id="322" r:id="rId17"/>
+    <p:sldId id="321" r:id="rId18"/>
+    <p:sldId id="316" r:id="rId19"/>
+    <p:sldId id="315" r:id="rId20"/>
+    <p:sldId id="313" r:id="rId21"/>
   </p:sldIdLst>
   <p:sldSz cx="9144000" cy="6858000" type="screen4x3"/>
   <p:notesSz cx="6858000" cy="9144000"/>
@@ -1506,6 +1507,107 @@
                 <a:defRPr/>
               </a:pPr>
               <a:t>18</a:t>
+            </a:fld>
+            <a:endParaRPr lang="fr-FR"/>
+          </a:p>
+        </p:txBody>
+      </p:sp>
+    </p:spTree>
+  </p:cSld>
+  <p:clrMapOvr>
+    <a:masterClrMapping/>
+  </p:clrMapOvr>
+</p:notes>
+</file>
+
+<file path=ppt/notesSlides/notesSlide19.xml><?xml version="1.0" encoding="utf-8"?>
+<p:notes xmlns:a="http://schemas.openxmlformats.org/drawingml/2006/main" xmlns:r="http://schemas.openxmlformats.org/officeDocument/2006/relationships" xmlns:p="http://schemas.openxmlformats.org/presentationml/2006/main">
+  <p:cSld>
+    <p:spTree>
+      <p:nvGrpSpPr>
+        <p:cNvPr id="1" name=""/>
+        <p:cNvGrpSpPr/>
+        <p:nvPr/>
+      </p:nvGrpSpPr>
+      <p:grpSpPr>
+        <a:xfrm>
+          <a:off x="0" y="0"/>
+          <a:ext cx="0" cy="0"/>
+          <a:chOff x="0" y="0"/>
+          <a:chExt cx="0" cy="0"/>
+        </a:xfrm>
+      </p:grpSpPr>
+      <p:sp>
+        <p:nvSpPr>
+          <p:cNvPr id="21506" name="Espace réservé de l'image des diapositives 1"/>
+          <p:cNvSpPr>
+            <a:spLocks noGrp="1" noRot="1" noChangeAspect="1" noTextEdit="1"/>
+          </p:cNvSpPr>
+          <p:nvPr>
+            <p:ph type="sldImg"/>
+          </p:nvPr>
+        </p:nvSpPr>
+        <p:spPr bwMode="auto">
+          <a:noFill/>
+          <a:ln>
+            <a:solidFill>
+              <a:srgbClr val="000000"/>
+            </a:solidFill>
+            <a:miter lim="800000"/>
+            <a:headEnd/>
+            <a:tailEnd/>
+          </a:ln>
+        </p:spPr>
+      </p:sp>
+      <p:sp>
+        <p:nvSpPr>
+          <p:cNvPr id="21507" name="Espace réservé des commentaires 2"/>
+          <p:cNvSpPr>
+            <a:spLocks noGrp="1"/>
+          </p:cNvSpPr>
+          <p:nvPr>
+            <p:ph type="body" idx="1"/>
+          </p:nvPr>
+        </p:nvSpPr>
+        <p:spPr bwMode="auto">
+          <a:noFill/>
+        </p:spPr>
+        <p:txBody>
+          <a:bodyPr wrap="square" numCol="1" anchor="t" anchorCtr="0" compatLnSpc="1">
+            <a:prstTxWarp prst="textNoShape">
+              <a:avLst/>
+            </a:prstTxWarp>
+          </a:bodyPr>
+          <a:lstStyle/>
+          <a:p>
+            <a:endParaRPr lang="fr-FR" smtClean="0"/>
+          </a:p>
+        </p:txBody>
+      </p:sp>
+      <p:sp>
+        <p:nvSpPr>
+          <p:cNvPr id="4" name="Espace réservé du numéro de diapositive 3"/>
+          <p:cNvSpPr>
+            <a:spLocks noGrp="1"/>
+          </p:cNvSpPr>
+          <p:nvPr>
+            <p:ph type="sldNum" sz="quarter" idx="5"/>
+          </p:nvPr>
+        </p:nvSpPr>
+        <p:spPr/>
+        <p:txBody>
+          <a:bodyPr/>
+          <a:lstStyle/>
+          <a:p>
+            <a:pPr>
+              <a:defRPr/>
+            </a:pPr>
+            <a:fld id="{445C0ADE-5444-4AF0-8585-266DB2CCD55E}" type="slidenum">
+              <a:rPr lang="fr-FR" smtClean="0"/>
+              <a:pPr>
+                <a:defRPr/>
+              </a:pPr>
+              <a:t>19</a:t>
             </a:fld>
             <a:endParaRPr lang="fr-FR"/>
           </a:p>
@@ -5390,11 +5492,7 @@
             </a:pPr>
             <a:r>
               <a:rPr lang="fr-FR" sz="2400" dirty="0" smtClean="0"/>
-              <a:t>Equipe </a:t>
-            </a:r>
-            <a:r>
-              <a:rPr lang="fr-FR" sz="2400" dirty="0" smtClean="0"/>
-              <a:t>Gamma</a:t>
+              <a:t>Equipe Gamma</a:t>
             </a:r>
             <a:endParaRPr lang="fr-FR" sz="2400" dirty="0"/>
           </a:p>
@@ -5407,11 +5505,7 @@
             </a:pPr>
             <a:r>
               <a:rPr lang="fr-FR" sz="1600" dirty="0" smtClean="0"/>
-              <a:t>Aymeric </a:t>
-            </a:r>
-            <a:r>
-              <a:rPr lang="fr-FR" sz="1600" dirty="0" smtClean="0"/>
-              <a:t>ASSIER – Mickaël ARNOULD – Adrien LOMBARD – Sébastien FRANCHON</a:t>
+              <a:t>Aymeric ASSIER – Mickaël ARNOULD – Adrien LOMBARD – Sébastien FRANCHON</a:t>
             </a:r>
             <a:r>
               <a:rPr lang="fr-FR" sz="1600" dirty="0"/>
@@ -5537,9 +5631,139 @@
           <a:chExt cx="0" cy="0"/>
         </a:xfrm>
       </p:grpSpPr>
+      <p:sp>
+        <p:nvSpPr>
+          <p:cNvPr id="3074" name="Titre 1"/>
+          <p:cNvSpPr>
+            <a:spLocks noGrp="1"/>
+          </p:cNvSpPr>
+          <p:nvPr>
+            <p:ph type="title"/>
+          </p:nvPr>
+        </p:nvSpPr>
+        <p:spPr>
+          <a:xfrm>
+            <a:off x="457200" y="773832"/>
+            <a:ext cx="8229600" cy="1143000"/>
+          </a:xfrm>
+        </p:spPr>
+        <p:txBody>
+          <a:bodyPr/>
+          <a:lstStyle/>
+          <a:p>
+            <a:r>
+              <a:rPr lang="fr-FR" dirty="0" smtClean="0"/>
+              <a:t>Plan</a:t>
+            </a:r>
+          </a:p>
+        </p:txBody>
+      </p:sp>
+      <p:sp>
+        <p:nvSpPr>
+          <p:cNvPr id="3075" name="Espace réservé du contenu 2"/>
+          <p:cNvSpPr>
+            <a:spLocks noGrp="1"/>
+          </p:cNvSpPr>
+          <p:nvPr>
+            <p:ph idx="1"/>
+          </p:nvPr>
+        </p:nvSpPr>
+        <p:spPr>
+          <a:xfrm>
+            <a:off x="457200" y="1600200"/>
+            <a:ext cx="8229600" cy="5141168"/>
+          </a:xfrm>
+        </p:spPr>
+        <p:txBody>
+          <a:bodyPr>
+            <a:normAutofit/>
+          </a:bodyPr>
+          <a:lstStyle/>
+          <a:p>
+            <a:pPr>
+              <a:lnSpc>
+                <a:spcPct val="170000"/>
+              </a:lnSpc>
+            </a:pPr>
+            <a:r>
+              <a:rPr lang="fr-FR" dirty="0" smtClean="0">
+                <a:solidFill>
+                  <a:schemeClr val="bg1">
+                    <a:lumMod val="50000"/>
+                  </a:schemeClr>
+                </a:solidFill>
+              </a:rPr>
+              <a:t>Le contexte</a:t>
+            </a:r>
+          </a:p>
+          <a:p>
+            <a:pPr>
+              <a:lnSpc>
+                <a:spcPct val="170000"/>
+              </a:lnSpc>
+            </a:pPr>
+            <a:r>
+              <a:rPr lang="fr-FR" dirty="0" smtClean="0">
+                <a:solidFill>
+                  <a:schemeClr val="bg1">
+                    <a:lumMod val="50000"/>
+                  </a:schemeClr>
+                </a:solidFill>
+              </a:rPr>
+              <a:t>Le projet</a:t>
+            </a:r>
+          </a:p>
+          <a:p>
+            <a:pPr>
+              <a:lnSpc>
+                <a:spcPct val="170000"/>
+              </a:lnSpc>
+            </a:pPr>
+            <a:r>
+              <a:rPr lang="fr-FR" dirty="0" smtClean="0"/>
+              <a:t>Conception</a:t>
+            </a:r>
+          </a:p>
+          <a:p>
+            <a:pPr>
+              <a:lnSpc>
+                <a:spcPct val="170000"/>
+              </a:lnSpc>
+            </a:pPr>
+            <a:r>
+              <a:rPr lang="fr-FR" dirty="0" smtClean="0">
+                <a:solidFill>
+                  <a:schemeClr val="bg1">
+                    <a:lumMod val="50000"/>
+                  </a:schemeClr>
+                </a:solidFill>
+              </a:rPr>
+              <a:t>Démonstration</a:t>
+            </a:r>
+          </a:p>
+          <a:p>
+            <a:pPr>
+              <a:lnSpc>
+                <a:spcPct val="170000"/>
+              </a:lnSpc>
+            </a:pPr>
+            <a:r>
+              <a:rPr lang="fr-FR" dirty="0" smtClean="0">
+                <a:solidFill>
+                  <a:schemeClr val="bg1">
+                    <a:lumMod val="50000"/>
+                  </a:schemeClr>
+                </a:solidFill>
+              </a:rPr>
+              <a:t>Gestion de projet</a:t>
+            </a:r>
+            <a:endParaRPr lang="fr-FR" dirty="0" smtClean="0"/>
+          </a:p>
+        </p:txBody>
+      </p:sp>
       <p:pic>
         <p:nvPicPr>
-          <p:cNvPr id="5" name="Image 4"/>
+          <p:cNvPr id="3076" name="Image 4"/>
           <p:cNvPicPr>
             <a:picLocks noChangeAspect="1"/>
           </p:cNvPicPr>
@@ -5571,7 +5795,7 @@
       </p:pic>
       <p:sp>
         <p:nvSpPr>
-          <p:cNvPr id="6" name="Espace réservé du numéro de diapositive 1"/>
+          <p:cNvPr id="2" name="Espace réservé du numéro de diapositive 1"/>
           <p:cNvSpPr>
             <a:spLocks noGrp="1"/>
           </p:cNvSpPr>
@@ -5579,12 +5803,7 @@
             <p:ph type="sldNum" sz="quarter" idx="12"/>
           </p:nvPr>
         </p:nvSpPr>
-        <p:spPr>
-          <a:xfrm>
-            <a:off x="6553200" y="6356350"/>
-            <a:ext cx="2133600" cy="365125"/>
-          </a:xfrm>
-        </p:spPr>
+        <p:spPr/>
         <p:txBody>
           <a:bodyPr/>
           <a:lstStyle/>
@@ -5603,77 +5822,10 @@
           </a:p>
         </p:txBody>
       </p:sp>
-      <p:sp>
-        <p:nvSpPr>
-          <p:cNvPr id="7" name="Titre 1"/>
-          <p:cNvSpPr>
-            <a:spLocks noGrp="1"/>
-          </p:cNvSpPr>
-          <p:nvPr>
-            <p:ph type="title"/>
-          </p:nvPr>
-        </p:nvSpPr>
-        <p:spPr>
-          <a:xfrm>
-            <a:off x="662880" y="341784"/>
-            <a:ext cx="8229600" cy="1143000"/>
-          </a:xfrm>
-        </p:spPr>
-        <p:txBody>
-          <a:bodyPr>
-            <a:normAutofit/>
-          </a:bodyPr>
-          <a:lstStyle/>
-          <a:p>
-            <a:pPr algn="r"/>
-            <a:r>
-              <a:rPr lang="fr-FR" sz="2800" dirty="0" smtClean="0"/>
-              <a:t>MCD</a:t>
-            </a:r>
-          </a:p>
-        </p:txBody>
-      </p:sp>
-      <p:pic>
-        <p:nvPicPr>
-          <p:cNvPr id="5122" name="Picture 2" descr="D:\School\2011 - Master ISC\S8\Courchevel\doc\Conception\V2\MCD.PNG"/>
-          <p:cNvPicPr>
-            <a:picLocks noChangeAspect="1" noChangeArrowheads="1"/>
-          </p:cNvPicPr>
-          <p:nvPr/>
-        </p:nvPicPr>
-        <p:blipFill>
-          <a:blip r:embed="rId4" cstate="print">
-            <a:clrChange>
-              <a:clrFrom>
-                <a:srgbClr val="FFFFFF"/>
-              </a:clrFrom>
-              <a:clrTo>
-                <a:srgbClr val="FFFFFF">
-                  <a:alpha val="0"/>
-                </a:srgbClr>
-              </a:clrTo>
-            </a:clrChange>
-          </a:blip>
-          <a:srcRect/>
-          <a:stretch>
-            <a:fillRect/>
-          </a:stretch>
-        </p:blipFill>
-        <p:spPr bwMode="auto">
-          <a:xfrm>
-            <a:off x="395536" y="980728"/>
-            <a:ext cx="8388423" cy="5479947"/>
-          </a:xfrm>
-          <a:prstGeom prst="rect">
-            <a:avLst/>
-          </a:prstGeom>
-          <a:noFill/>
-        </p:spPr>
-      </p:pic>
     </p:spTree>
     <p:extLst>
       <p:ext uri="{BB962C8B-B14F-4D97-AF65-F5344CB8AC3E}">
-        <p14:creationId xmlns:p14="http://schemas.microsoft.com/office/powerpoint/2010/main" val="3405881691"/>
+        <p14:creationId xmlns:p14="http://schemas.microsoft.com/office/powerpoint/2010/main" val="2623020860"/>
       </p:ext>
     </p:extLst>
   </p:cSld>
@@ -5721,7 +5873,7 @@
       </p:grpSpPr>
       <p:pic>
         <p:nvPicPr>
-          <p:cNvPr id="3076" name="Image 4"/>
+          <p:cNvPr id="5" name="Image 4"/>
           <p:cNvPicPr>
             <a:picLocks noChangeAspect="1"/>
           </p:cNvPicPr>
@@ -5753,7 +5905,7 @@
       </p:pic>
       <p:sp>
         <p:nvSpPr>
-          <p:cNvPr id="2" name="Espace réservé du numéro de diapositive 1"/>
+          <p:cNvPr id="6" name="Espace réservé du numéro de diapositive 1"/>
           <p:cNvSpPr>
             <a:spLocks noGrp="1"/>
           </p:cNvSpPr>
@@ -5761,7 +5913,12 @@
             <p:ph type="sldNum" sz="quarter" idx="12"/>
           </p:nvPr>
         </p:nvSpPr>
-        <p:spPr/>
+        <p:spPr>
+          <a:xfrm>
+            <a:off x="6553200" y="6356350"/>
+            <a:ext cx="2133600" cy="365125"/>
+          </a:xfrm>
+        </p:spPr>
         <p:txBody>
           <a:bodyPr/>
           <a:lstStyle/>
@@ -5782,7 +5939,7 @@
       </p:sp>
       <p:sp>
         <p:nvSpPr>
-          <p:cNvPr id="6" name="Titre 1"/>
+          <p:cNvPr id="7" name="Titre 1"/>
           <p:cNvSpPr>
             <a:spLocks noGrp="1"/>
           </p:cNvSpPr>
@@ -5792,7 +5949,7 @@
         </p:nvSpPr>
         <p:spPr>
           <a:xfrm>
-            <a:off x="662880" y="413792"/>
+            <a:off x="662880" y="341784"/>
             <a:ext cx="8229600" cy="1143000"/>
           </a:xfrm>
         </p:spPr>
@@ -5805,14 +5962,14 @@
             <a:pPr algn="r"/>
             <a:r>
               <a:rPr lang="fr-FR" sz="2800" dirty="0" smtClean="0"/>
-              <a:t>Cas d’utilisation : Organisateur</a:t>
+              <a:t>MCD</a:t>
             </a:r>
           </a:p>
         </p:txBody>
       </p:sp>
       <p:pic>
         <p:nvPicPr>
-          <p:cNvPr id="1027" name="Picture 3" descr="D:\School\2011 - Master ISC\S8\Courchevel\doc\Conception\V2\UseCase-Organisateur.PNG"/>
+          <p:cNvPr id="5122" name="Picture 2" descr="D:\School\2011 - Master ISC\S8\Courchevel\doc\Conception\V2\MCD.PNG"/>
           <p:cNvPicPr>
             <a:picLocks noChangeAspect="1" noChangeArrowheads="1"/>
           </p:cNvPicPr>
@@ -5838,8 +5995,8 @@
         </p:blipFill>
         <p:spPr bwMode="auto">
           <a:xfrm>
-            <a:off x="307726" y="1628800"/>
-            <a:ext cx="8440738" cy="4676775"/>
+            <a:off x="395536" y="980728"/>
+            <a:ext cx="8388423" cy="5479947"/>
           </a:xfrm>
           <a:prstGeom prst="rect">
             <a:avLst/>
@@ -5850,7 +6007,7 @@
     </p:spTree>
     <p:extLst>
       <p:ext uri="{BB962C8B-B14F-4D97-AF65-F5344CB8AC3E}">
-        <p14:creationId xmlns:p14="http://schemas.microsoft.com/office/powerpoint/2010/main" val="2467418535"/>
+        <p14:creationId xmlns:p14="http://schemas.microsoft.com/office/powerpoint/2010/main" val="3405881691"/>
       </p:ext>
     </p:extLst>
   </p:cSld>
@@ -5898,7 +6055,7 @@
       </p:grpSpPr>
       <p:pic>
         <p:nvPicPr>
-          <p:cNvPr id="5" name="Image 4"/>
+          <p:cNvPr id="3076" name="Image 4"/>
           <p:cNvPicPr>
             <a:picLocks noChangeAspect="1"/>
           </p:cNvPicPr>
@@ -5930,7 +6087,7 @@
       </p:pic>
       <p:sp>
         <p:nvSpPr>
-          <p:cNvPr id="6" name="Espace réservé du numéro de diapositive 1"/>
+          <p:cNvPr id="2" name="Espace réservé du numéro de diapositive 1"/>
           <p:cNvSpPr>
             <a:spLocks noGrp="1"/>
           </p:cNvSpPr>
@@ -5938,12 +6095,7 @@
             <p:ph type="sldNum" sz="quarter" idx="12"/>
           </p:nvPr>
         </p:nvSpPr>
-        <p:spPr>
-          <a:xfrm>
-            <a:off x="6553200" y="6356350"/>
-            <a:ext cx="2133600" cy="365125"/>
-          </a:xfrm>
-        </p:spPr>
+        <p:spPr/>
         <p:txBody>
           <a:bodyPr/>
           <a:lstStyle/>
@@ -5964,7 +6116,7 @@
       </p:sp>
       <p:sp>
         <p:nvSpPr>
-          <p:cNvPr id="7" name="Titre 1"/>
+          <p:cNvPr id="6" name="Titre 1"/>
           <p:cNvSpPr>
             <a:spLocks noGrp="1"/>
           </p:cNvSpPr>
@@ -5987,21 +6139,21 @@
             <a:pPr algn="r"/>
             <a:r>
               <a:rPr lang="fr-FR" sz="2800" dirty="0" smtClean="0"/>
-              <a:t>Cas d’utilisation : Accréditeur</a:t>
+              <a:t>Cas d’utilisation : Organisateur</a:t>
             </a:r>
           </a:p>
         </p:txBody>
       </p:sp>
       <p:pic>
         <p:nvPicPr>
-          <p:cNvPr id="1026" name="Picture 2" descr="D:\Univ\INFO 891 - Projet Professionnalisant\doc\Conception\V2\Copie de UseCase-Accréditateur.PNG"/>
+          <p:cNvPr id="1027" name="Picture 3" descr="D:\School\2011 - Master ISC\S8\Courchevel\doc\Conception\V2\UseCase-Organisateur.PNG"/>
           <p:cNvPicPr>
             <a:picLocks noChangeAspect="1" noChangeArrowheads="1"/>
           </p:cNvPicPr>
           <p:nvPr/>
         </p:nvPicPr>
         <p:blipFill>
-          <a:blip r:embed="rId4">
+          <a:blip r:embed="rId4" cstate="print">
             <a:clrChange>
               <a:clrFrom>
                 <a:srgbClr val="FFFFFF"/>
@@ -6012,11 +6164,6 @@
                 </a:srgbClr>
               </a:clrTo>
             </a:clrChange>
-            <a:extLst>
-              <a:ext uri="{28A0092B-C50C-407E-A947-70E740481C1C}">
-                <a14:useLocalDpi xmlns:a14="http://schemas.microsoft.com/office/drawing/2010/main" val="0"/>
-              </a:ext>
-            </a:extLst>
           </a:blip>
           <a:srcRect/>
           <a:stretch>
@@ -6025,28 +6172,19 @@
         </p:blipFill>
         <p:spPr bwMode="auto">
           <a:xfrm>
-            <a:off x="395536" y="1179742"/>
-            <a:ext cx="8407797" cy="5561625"/>
+            <a:off x="307726" y="1628800"/>
+            <a:ext cx="8440738" cy="4676775"/>
           </a:xfrm>
           <a:prstGeom prst="rect">
             <a:avLst/>
           </a:prstGeom>
           <a:noFill/>
-          <a:extLst>
-            <a:ext uri="{909E8E84-426E-40DD-AFC4-6F175D3DCCD1}">
-              <a14:hiddenFill xmlns:a14="http://schemas.microsoft.com/office/drawing/2010/main">
-                <a:solidFill>
-                  <a:srgbClr val="FFFFFF"/>
-                </a:solidFill>
-              </a14:hiddenFill>
-            </a:ext>
-          </a:extLst>
         </p:spPr>
       </p:pic>
     </p:spTree>
     <p:extLst>
       <p:ext uri="{BB962C8B-B14F-4D97-AF65-F5344CB8AC3E}">
-        <p14:creationId xmlns:p14="http://schemas.microsoft.com/office/powerpoint/2010/main" val="1434209132"/>
+        <p14:creationId xmlns:p14="http://schemas.microsoft.com/office/powerpoint/2010/main" val="2467418535"/>
       </p:ext>
     </p:extLst>
   </p:cSld>
@@ -6160,6 +6298,202 @@
       </p:sp>
       <p:sp>
         <p:nvSpPr>
+          <p:cNvPr id="7" name="Titre 1"/>
+          <p:cNvSpPr>
+            <a:spLocks noGrp="1"/>
+          </p:cNvSpPr>
+          <p:nvPr>
+            <p:ph type="title"/>
+          </p:nvPr>
+        </p:nvSpPr>
+        <p:spPr>
+          <a:xfrm>
+            <a:off x="662880" y="413792"/>
+            <a:ext cx="8229600" cy="1143000"/>
+          </a:xfrm>
+        </p:spPr>
+        <p:txBody>
+          <a:bodyPr>
+            <a:normAutofit/>
+          </a:bodyPr>
+          <a:lstStyle/>
+          <a:p>
+            <a:pPr algn="r"/>
+            <a:r>
+              <a:rPr lang="fr-FR" sz="2800" dirty="0" smtClean="0"/>
+              <a:t>Cas d’utilisation : Accréditeur</a:t>
+            </a:r>
+          </a:p>
+        </p:txBody>
+      </p:sp>
+      <p:pic>
+        <p:nvPicPr>
+          <p:cNvPr id="1026" name="Picture 2" descr="D:\Univ\INFO 891 - Projet Professionnalisant\doc\Conception\V2\Copie de UseCase-Accréditateur.PNG"/>
+          <p:cNvPicPr>
+            <a:picLocks noChangeAspect="1" noChangeArrowheads="1"/>
+          </p:cNvPicPr>
+          <p:nvPr/>
+        </p:nvPicPr>
+        <p:blipFill>
+          <a:blip r:embed="rId4">
+            <a:clrChange>
+              <a:clrFrom>
+                <a:srgbClr val="FFFFFF"/>
+              </a:clrFrom>
+              <a:clrTo>
+                <a:srgbClr val="FFFFFF">
+                  <a:alpha val="0"/>
+                </a:srgbClr>
+              </a:clrTo>
+            </a:clrChange>
+            <a:extLst>
+              <a:ext uri="{28A0092B-C50C-407E-A947-70E740481C1C}">
+                <a14:useLocalDpi xmlns:a14="http://schemas.microsoft.com/office/drawing/2010/main" val="0"/>
+              </a:ext>
+            </a:extLst>
+          </a:blip>
+          <a:srcRect/>
+          <a:stretch>
+            <a:fillRect/>
+          </a:stretch>
+        </p:blipFill>
+        <p:spPr bwMode="auto">
+          <a:xfrm>
+            <a:off x="395536" y="1179742"/>
+            <a:ext cx="8407797" cy="5561625"/>
+          </a:xfrm>
+          <a:prstGeom prst="rect">
+            <a:avLst/>
+          </a:prstGeom>
+          <a:noFill/>
+          <a:extLst>
+            <a:ext uri="{909E8E84-426E-40DD-AFC4-6F175D3DCCD1}">
+              <a14:hiddenFill xmlns:a14="http://schemas.microsoft.com/office/drawing/2010/main">
+                <a:solidFill>
+                  <a:srgbClr val="FFFFFF"/>
+                </a:solidFill>
+              </a14:hiddenFill>
+            </a:ext>
+          </a:extLst>
+        </p:spPr>
+      </p:pic>
+    </p:spTree>
+    <p:extLst>
+      <p:ext uri="{BB962C8B-B14F-4D97-AF65-F5344CB8AC3E}">
+        <p14:creationId xmlns:p14="http://schemas.microsoft.com/office/powerpoint/2010/main" val="1434209132"/>
+      </p:ext>
+    </p:extLst>
+  </p:cSld>
+  <p:clrMapOvr>
+    <a:masterClrMapping/>
+  </p:clrMapOvr>
+  <mc:AlternateContent xmlns:mc="http://schemas.openxmlformats.org/markup-compatibility/2006" xmlns:p14="http://schemas.microsoft.com/office/powerpoint/2010/main">
+    <mc:Choice Requires="p14">
+      <p:transition spd="med">
+        <p14:gallery dir="l"/>
+      </p:transition>
+    </mc:Choice>
+    <mc:Fallback xmlns="">
+      <p:transition spd="med">
+        <p:fade/>
+      </p:transition>
+    </mc:Fallback>
+  </mc:AlternateContent>
+  <p:timing>
+    <p:tnLst>
+      <p:par>
+        <p:cTn id="1" dur="indefinite" restart="never" nodeType="tmRoot"/>
+      </p:par>
+    </p:tnLst>
+  </p:timing>
+</p:sld>
+</file>
+
+<file path=ppt/slides/slide14.xml><?xml version="1.0" encoding="utf-8"?>
+<p:sld xmlns:a="http://schemas.openxmlformats.org/drawingml/2006/main" xmlns:r="http://schemas.openxmlformats.org/officeDocument/2006/relationships" xmlns:p="http://schemas.openxmlformats.org/presentationml/2006/main">
+  <p:cSld>
+    <p:spTree>
+      <p:nvGrpSpPr>
+        <p:cNvPr id="1" name=""/>
+        <p:cNvGrpSpPr/>
+        <p:nvPr/>
+      </p:nvGrpSpPr>
+      <p:grpSpPr>
+        <a:xfrm>
+          <a:off x="0" y="0"/>
+          <a:ext cx="0" cy="0"/>
+          <a:chOff x="0" y="0"/>
+          <a:chExt cx="0" cy="0"/>
+        </a:xfrm>
+      </p:grpSpPr>
+      <p:pic>
+        <p:nvPicPr>
+          <p:cNvPr id="5" name="Image 4"/>
+          <p:cNvPicPr>
+            <a:picLocks noChangeAspect="1"/>
+          </p:cNvPicPr>
+          <p:nvPr/>
+        </p:nvPicPr>
+        <p:blipFill>
+          <a:blip r:embed="rId3" cstate="print"/>
+          <a:srcRect/>
+          <a:stretch>
+            <a:fillRect/>
+          </a:stretch>
+        </p:blipFill>
+        <p:spPr bwMode="auto">
+          <a:xfrm>
+            <a:off x="0" y="0"/>
+            <a:ext cx="9144000" cy="646113"/>
+          </a:xfrm>
+          <a:prstGeom prst="rect">
+            <a:avLst/>
+          </a:prstGeom>
+          <a:noFill/>
+          <a:ln w="9525">
+            <a:noFill/>
+            <a:miter lim="800000"/>
+            <a:headEnd/>
+            <a:tailEnd/>
+          </a:ln>
+        </p:spPr>
+      </p:pic>
+      <p:sp>
+        <p:nvSpPr>
+          <p:cNvPr id="6" name="Espace réservé du numéro de diapositive 1"/>
+          <p:cNvSpPr>
+            <a:spLocks noGrp="1"/>
+          </p:cNvSpPr>
+          <p:nvPr>
+            <p:ph type="sldNum" sz="quarter" idx="12"/>
+          </p:nvPr>
+        </p:nvSpPr>
+        <p:spPr>
+          <a:xfrm>
+            <a:off x="6553200" y="6356350"/>
+            <a:ext cx="2133600" cy="365125"/>
+          </a:xfrm>
+        </p:spPr>
+        <p:txBody>
+          <a:bodyPr/>
+          <a:lstStyle/>
+          <a:p>
+            <a:pPr>
+              <a:defRPr/>
+            </a:pPr>
+            <a:fld id="{CEE9F434-548C-4338-8DF1-58B3EAFD3701}" type="slidenum">
+              <a:rPr lang="fr-FR" smtClean="0"/>
+              <a:pPr>
+                <a:defRPr/>
+              </a:pPr>
+              <a:t>14</a:t>
+            </a:fld>
+            <a:endParaRPr lang="fr-FR"/>
+          </a:p>
+        </p:txBody>
+      </p:sp>
+      <p:sp>
+        <p:nvSpPr>
           <p:cNvPr id="8" name="Titre 1"/>
           <p:cNvSpPr>
             <a:spLocks noGrp="1"/>
@@ -6271,7 +6605,7 @@
 </p:sld>
 </file>
 
-<file path=ppt/slides/slide14.xml><?xml version="1.0" encoding="utf-8"?>
+<file path=ppt/slides/slide15.xml><?xml version="1.0" encoding="utf-8"?>
 <p:sld xmlns:a="http://schemas.openxmlformats.org/drawingml/2006/main" xmlns:r="http://schemas.openxmlformats.org/officeDocument/2006/relationships" xmlns:p="http://schemas.openxmlformats.org/presentationml/2006/main">
   <p:cSld>
     <p:spTree>
@@ -6473,7 +6807,7 @@
               <a:pPr>
                 <a:defRPr/>
               </a:pPr>
-              <a:t>14</a:t>
+              <a:t>15</a:t>
             </a:fld>
             <a:endParaRPr lang="fr-FR"/>
           </a:p>
@@ -6483,184 +6817,6 @@
     <p:extLst>
       <p:ext uri="{BB962C8B-B14F-4D97-AF65-F5344CB8AC3E}">
         <p14:creationId xmlns:p14="http://schemas.microsoft.com/office/powerpoint/2010/main" val="2150257744"/>
-      </p:ext>
-    </p:extLst>
-  </p:cSld>
-  <p:clrMapOvr>
-    <a:masterClrMapping/>
-  </p:clrMapOvr>
-  <mc:AlternateContent xmlns:mc="http://schemas.openxmlformats.org/markup-compatibility/2006" xmlns:p14="http://schemas.microsoft.com/office/powerpoint/2010/main">
-    <mc:Choice Requires="p14">
-      <p:transition spd="med">
-        <p14:gallery dir="l"/>
-      </p:transition>
-    </mc:Choice>
-    <mc:Fallback xmlns="">
-      <p:transition spd="med">
-        <p:fade/>
-      </p:transition>
-    </mc:Fallback>
-  </mc:AlternateContent>
-  <p:timing>
-    <p:tnLst>
-      <p:par>
-        <p:cTn id="1" dur="indefinite" restart="never" nodeType="tmRoot"/>
-      </p:par>
-    </p:tnLst>
-  </p:timing>
-</p:sld>
-</file>
-
-<file path=ppt/slides/slide15.xml><?xml version="1.0" encoding="utf-8"?>
-<p:sld xmlns:a="http://schemas.openxmlformats.org/drawingml/2006/main" xmlns:r="http://schemas.openxmlformats.org/officeDocument/2006/relationships" xmlns:p="http://schemas.openxmlformats.org/presentationml/2006/main">
-  <p:cSld>
-    <p:spTree>
-      <p:nvGrpSpPr>
-        <p:cNvPr id="1" name=""/>
-        <p:cNvGrpSpPr/>
-        <p:nvPr/>
-      </p:nvGrpSpPr>
-      <p:grpSpPr>
-        <a:xfrm>
-          <a:off x="0" y="0"/>
-          <a:ext cx="0" cy="0"/>
-          <a:chOff x="0" y="0"/>
-          <a:chExt cx="0" cy="0"/>
-        </a:xfrm>
-      </p:grpSpPr>
-      <p:sp>
-        <p:nvSpPr>
-          <p:cNvPr id="3074" name="Titre 1"/>
-          <p:cNvSpPr>
-            <a:spLocks noGrp="1"/>
-          </p:cNvSpPr>
-          <p:nvPr>
-            <p:ph type="title"/>
-          </p:nvPr>
-        </p:nvSpPr>
-        <p:spPr>
-          <a:xfrm>
-            <a:off x="457200" y="773832"/>
-            <a:ext cx="8229600" cy="1143000"/>
-          </a:xfrm>
-        </p:spPr>
-        <p:txBody>
-          <a:bodyPr/>
-          <a:lstStyle/>
-          <a:p>
-            <a:endParaRPr lang="fr-FR" dirty="0" smtClean="0"/>
-          </a:p>
-        </p:txBody>
-      </p:sp>
-      <p:sp>
-        <p:nvSpPr>
-          <p:cNvPr id="3075" name="Espace réservé du contenu 2"/>
-          <p:cNvSpPr>
-            <a:spLocks noGrp="1"/>
-          </p:cNvSpPr>
-          <p:nvPr>
-            <p:ph idx="1"/>
-          </p:nvPr>
-        </p:nvSpPr>
-        <p:spPr>
-          <a:xfrm>
-            <a:off x="457200" y="1600200"/>
-            <a:ext cx="8229600" cy="5141168"/>
-          </a:xfrm>
-        </p:spPr>
-        <p:txBody>
-          <a:bodyPr>
-            <a:normAutofit/>
-          </a:bodyPr>
-          <a:lstStyle/>
-          <a:p>
-            <a:pPr marL="0" indent="0">
-              <a:lnSpc>
-                <a:spcPct val="170000"/>
-              </a:lnSpc>
-              <a:buNone/>
-            </a:pPr>
-            <a:endParaRPr lang="fr-FR" dirty="0"/>
-          </a:p>
-          <a:p>
-            <a:pPr marL="0" indent="0" algn="ctr">
-              <a:lnSpc>
-                <a:spcPct val="170000"/>
-              </a:lnSpc>
-              <a:buNone/>
-            </a:pPr>
-            <a:r>
-              <a:rPr lang="fr-FR" sz="7200" dirty="0" smtClean="0"/>
-              <a:t>Démonstration</a:t>
-            </a:r>
-          </a:p>
-        </p:txBody>
-      </p:sp>
-      <p:pic>
-        <p:nvPicPr>
-          <p:cNvPr id="3076" name="Image 4"/>
-          <p:cNvPicPr>
-            <a:picLocks noChangeAspect="1"/>
-          </p:cNvPicPr>
-          <p:nvPr/>
-        </p:nvPicPr>
-        <p:blipFill>
-          <a:blip r:embed="rId3" cstate="print"/>
-          <a:srcRect/>
-          <a:stretch>
-            <a:fillRect/>
-          </a:stretch>
-        </p:blipFill>
-        <p:spPr bwMode="auto">
-          <a:xfrm>
-            <a:off x="0" y="0"/>
-            <a:ext cx="9144000" cy="646113"/>
-          </a:xfrm>
-          <a:prstGeom prst="rect">
-            <a:avLst/>
-          </a:prstGeom>
-          <a:noFill/>
-          <a:ln w="9525">
-            <a:noFill/>
-            <a:miter lim="800000"/>
-            <a:headEnd/>
-            <a:tailEnd/>
-          </a:ln>
-        </p:spPr>
-      </p:pic>
-      <p:sp>
-        <p:nvSpPr>
-          <p:cNvPr id="2" name="Espace réservé du numéro de diapositive 1"/>
-          <p:cNvSpPr>
-            <a:spLocks noGrp="1"/>
-          </p:cNvSpPr>
-          <p:nvPr>
-            <p:ph type="sldNum" sz="quarter" idx="12"/>
-          </p:nvPr>
-        </p:nvSpPr>
-        <p:spPr/>
-        <p:txBody>
-          <a:bodyPr/>
-          <a:lstStyle/>
-          <a:p>
-            <a:pPr>
-              <a:defRPr/>
-            </a:pPr>
-            <a:fld id="{CEE9F434-548C-4338-8DF1-58B3EAFD3701}" type="slidenum">
-              <a:rPr lang="fr-FR" smtClean="0"/>
-              <a:pPr>
-                <a:defRPr/>
-              </a:pPr>
-              <a:t>15</a:t>
-            </a:fld>
-            <a:endParaRPr lang="fr-FR"/>
-          </a:p>
-        </p:txBody>
-      </p:sp>
-    </p:spTree>
-    <p:extLst>
-      <p:ext uri="{BB962C8B-B14F-4D97-AF65-F5344CB8AC3E}">
-        <p14:creationId xmlns:p14="http://schemas.microsoft.com/office/powerpoint/2010/main" val="705338575"/>
       </p:ext>
     </p:extLst>
   </p:cSld>
@@ -6726,10 +6882,7 @@
           <a:bodyPr/>
           <a:lstStyle/>
           <a:p>
-            <a:r>
-              <a:rPr lang="fr-FR" dirty="0" smtClean="0"/>
-              <a:t>Plan</a:t>
-            </a:r>
+            <a:endParaRPr lang="fr-FR" dirty="0" smtClean="0"/>
           </a:p>
         </p:txBody>
       </p:sp>
@@ -6755,82 +6908,24 @@
           </a:bodyPr>
           <a:lstStyle/>
           <a:p>
-            <a:pPr>
+            <a:pPr marL="0" indent="0">
               <a:lnSpc>
                 <a:spcPct val="170000"/>
               </a:lnSpc>
+              <a:buNone/>
             </a:pPr>
-            <a:r>
-              <a:rPr lang="fr-FR" dirty="0" smtClean="0">
-                <a:solidFill>
-                  <a:schemeClr val="bg1">
-                    <a:lumMod val="50000"/>
-                  </a:schemeClr>
-                </a:solidFill>
-              </a:rPr>
-              <a:t>Le contexte</a:t>
-            </a:r>
-          </a:p>
-          <a:p>
-            <a:pPr>
+            <a:endParaRPr lang="fr-FR" dirty="0"/>
+          </a:p>
+          <a:p>
+            <a:pPr marL="0" indent="0" algn="ctr">
               <a:lnSpc>
                 <a:spcPct val="170000"/>
               </a:lnSpc>
+              <a:buNone/>
             </a:pPr>
             <a:r>
-              <a:rPr lang="fr-FR" dirty="0" smtClean="0">
-                <a:solidFill>
-                  <a:schemeClr val="bg1">
-                    <a:lumMod val="50000"/>
-                  </a:schemeClr>
-                </a:solidFill>
-              </a:rPr>
-              <a:t>Le projet</a:t>
-            </a:r>
-          </a:p>
-          <a:p>
-            <a:pPr>
-              <a:lnSpc>
-                <a:spcPct val="170000"/>
-              </a:lnSpc>
-            </a:pPr>
-            <a:r>
-              <a:rPr lang="fr-FR" dirty="0" smtClean="0">
-                <a:solidFill>
-                  <a:schemeClr val="bg1">
-                    <a:lumMod val="50000"/>
-                  </a:schemeClr>
-                </a:solidFill>
-              </a:rPr>
-              <a:t>Conception</a:t>
-            </a:r>
-          </a:p>
-          <a:p>
-            <a:pPr>
-              <a:lnSpc>
-                <a:spcPct val="170000"/>
-              </a:lnSpc>
-            </a:pPr>
-            <a:r>
-              <a:rPr lang="fr-FR" dirty="0" smtClean="0">
-                <a:solidFill>
-                  <a:schemeClr val="bg1">
-                    <a:lumMod val="50000"/>
-                  </a:schemeClr>
-                </a:solidFill>
-              </a:rPr>
+              <a:rPr lang="fr-FR" sz="7200" dirty="0" smtClean="0"/>
               <a:t>Démonstration</a:t>
-            </a:r>
-          </a:p>
-          <a:p>
-            <a:pPr>
-              <a:lnSpc>
-                <a:spcPct val="170000"/>
-              </a:lnSpc>
-            </a:pPr>
-            <a:r>
-              <a:rPr lang="fr-FR" dirty="0" smtClean="0"/>
-              <a:t>Gestion de projet</a:t>
             </a:r>
           </a:p>
         </p:txBody>
@@ -6899,7 +6994,7 @@
     </p:spTree>
     <p:extLst>
       <p:ext uri="{BB962C8B-B14F-4D97-AF65-F5344CB8AC3E}">
-        <p14:creationId xmlns:p14="http://schemas.microsoft.com/office/powerpoint/2010/main" val="1040411829"/>
+        <p14:creationId xmlns:p14="http://schemas.microsoft.com/office/powerpoint/2010/main" val="705338575"/>
       </p:ext>
     </p:extLst>
   </p:cSld>
@@ -6967,7 +7062,109 @@
           <a:p>
             <a:r>
               <a:rPr lang="fr-FR" dirty="0" smtClean="0"/>
-              <a:t>Gestion projet</a:t>
+              <a:t>Plan</a:t>
+            </a:r>
+          </a:p>
+        </p:txBody>
+      </p:sp>
+      <p:sp>
+        <p:nvSpPr>
+          <p:cNvPr id="3075" name="Espace réservé du contenu 2"/>
+          <p:cNvSpPr>
+            <a:spLocks noGrp="1"/>
+          </p:cNvSpPr>
+          <p:nvPr>
+            <p:ph idx="1"/>
+          </p:nvPr>
+        </p:nvSpPr>
+        <p:spPr>
+          <a:xfrm>
+            <a:off x="457200" y="1600200"/>
+            <a:ext cx="8229600" cy="5141168"/>
+          </a:xfrm>
+        </p:spPr>
+        <p:txBody>
+          <a:bodyPr>
+            <a:normAutofit/>
+          </a:bodyPr>
+          <a:lstStyle/>
+          <a:p>
+            <a:pPr>
+              <a:lnSpc>
+                <a:spcPct val="170000"/>
+              </a:lnSpc>
+            </a:pPr>
+            <a:r>
+              <a:rPr lang="fr-FR" dirty="0" smtClean="0">
+                <a:solidFill>
+                  <a:schemeClr val="bg1">
+                    <a:lumMod val="50000"/>
+                  </a:schemeClr>
+                </a:solidFill>
+              </a:rPr>
+              <a:t>Le contexte</a:t>
+            </a:r>
+          </a:p>
+          <a:p>
+            <a:pPr>
+              <a:lnSpc>
+                <a:spcPct val="170000"/>
+              </a:lnSpc>
+            </a:pPr>
+            <a:r>
+              <a:rPr lang="fr-FR" dirty="0" smtClean="0">
+                <a:solidFill>
+                  <a:schemeClr val="bg1">
+                    <a:lumMod val="50000"/>
+                  </a:schemeClr>
+                </a:solidFill>
+              </a:rPr>
+              <a:t>Le projet</a:t>
+            </a:r>
+          </a:p>
+          <a:p>
+            <a:pPr>
+              <a:lnSpc>
+                <a:spcPct val="170000"/>
+              </a:lnSpc>
+            </a:pPr>
+            <a:r>
+              <a:rPr lang="fr-FR" dirty="0" smtClean="0">
+                <a:solidFill>
+                  <a:schemeClr val="bg1">
+                    <a:lumMod val="50000"/>
+                  </a:schemeClr>
+                </a:solidFill>
+              </a:rPr>
+              <a:t>Conception</a:t>
+            </a:r>
+          </a:p>
+          <a:p>
+            <a:pPr>
+              <a:lnSpc>
+                <a:spcPct val="170000"/>
+              </a:lnSpc>
+            </a:pPr>
+            <a:r>
+              <a:rPr lang="fr-FR" dirty="0" smtClean="0">
+                <a:solidFill>
+                  <a:schemeClr val="bg1">
+                    <a:lumMod val="50000"/>
+                  </a:schemeClr>
+                </a:solidFill>
+              </a:rPr>
+              <a:t>Démonstration</a:t>
+            </a:r>
+          </a:p>
+          <a:p>
+            <a:pPr>
+              <a:lnSpc>
+                <a:spcPct val="170000"/>
+              </a:lnSpc>
+            </a:pPr>
+            <a:r>
+              <a:rPr lang="fr-FR" dirty="0" smtClean="0"/>
+              <a:t>Gestion de projet</a:t>
             </a:r>
           </a:p>
         </p:txBody>
@@ -7033,92 +7230,10 @@
           </a:p>
         </p:txBody>
       </p:sp>
-      <p:sp>
-        <p:nvSpPr>
-          <p:cNvPr id="19" name="TextBox 18"/>
-          <p:cNvSpPr txBox="1"/>
-          <p:nvPr/>
-        </p:nvSpPr>
-        <p:spPr>
-          <a:xfrm>
-            <a:off x="467544" y="2420888"/>
-            <a:ext cx="8208912" cy="3046988"/>
-          </a:xfrm>
-          <a:prstGeom prst="rect">
-            <a:avLst/>
-          </a:prstGeom>
-          <a:noFill/>
-        </p:spPr>
-        <p:txBody>
-          <a:bodyPr wrap="square" rtlCol="0">
-            <a:spAutoFit/>
-          </a:bodyPr>
-          <a:lstStyle/>
-          <a:p>
-            <a:pPr marL="0" lvl="2">
-              <a:buFont typeface="Arial" pitchFamily="34" charset="0"/>
-              <a:buChar char="•"/>
-            </a:pPr>
-            <a:r>
-              <a:rPr lang="fr-FR" sz="3200" dirty="0" smtClean="0"/>
-              <a:t>    Application des méthodes Agile </a:t>
-            </a:r>
-          </a:p>
-          <a:p>
-            <a:pPr marL="0" lvl="2"/>
-            <a:r>
-              <a:rPr lang="fr-FR" sz="3200" dirty="0" smtClean="0"/>
-              <a:t>	(</a:t>
-            </a:r>
-            <a:r>
-              <a:rPr lang="fr-FR" sz="3200" dirty="0" err="1" smtClean="0"/>
-              <a:t>Scrum</a:t>
-            </a:r>
-            <a:r>
-              <a:rPr lang="fr-FR" sz="3200" dirty="0" smtClean="0"/>
-              <a:t> et XP)</a:t>
-            </a:r>
-          </a:p>
-          <a:p>
-            <a:pPr>
-              <a:buFont typeface="Arial" pitchFamily="34" charset="0"/>
-              <a:buChar char="•"/>
-            </a:pPr>
-            <a:r>
-              <a:rPr lang="fr-FR" sz="3200" dirty="0" smtClean="0"/>
-              <a:t>    Utilisation d’un SVN</a:t>
-            </a:r>
-          </a:p>
-          <a:p>
-            <a:pPr lvl="1"/>
-            <a:r>
-              <a:rPr lang="fr-FR" sz="3200" dirty="0" smtClean="0"/>
-              <a:t>	 (Google code)</a:t>
-            </a:r>
-          </a:p>
-          <a:p>
-            <a:pPr>
-              <a:buFont typeface="Arial" pitchFamily="34" charset="0"/>
-              <a:buChar char="•"/>
-            </a:pPr>
-            <a:r>
-              <a:rPr lang="fr-FR" sz="3200" dirty="0" smtClean="0"/>
-              <a:t>    Partage des documents</a:t>
-            </a:r>
-          </a:p>
-          <a:p>
-            <a:pPr lvl="1"/>
-            <a:r>
-              <a:rPr lang="fr-FR" sz="3200" dirty="0" smtClean="0"/>
-              <a:t>	 (Google doc)</a:t>
-            </a:r>
-          </a:p>
-        </p:txBody>
-      </p:sp>
     </p:spTree>
     <p:extLst>
       <p:ext uri="{BB962C8B-B14F-4D97-AF65-F5344CB8AC3E}">
-        <p14:creationId xmlns:p14="http://schemas.microsoft.com/office/powerpoint/2010/main" val="3741159515"/>
+        <p14:creationId xmlns:p14="http://schemas.microsoft.com/office/powerpoint/2010/main" val="1040411829"/>
       </p:ext>
     </p:extLst>
   </p:cSld>
@@ -7186,7 +7301,7 @@
           <a:p>
             <a:r>
               <a:rPr lang="fr-FR" dirty="0" smtClean="0"/>
-              <a:t>Avancement du projet</a:t>
+              <a:t>Gestion projet</a:t>
             </a:r>
           </a:p>
         </p:txBody>
@@ -7247,6 +7362,225 @@
                 <a:defRPr/>
               </a:pPr>
               <a:t>18</a:t>
+            </a:fld>
+            <a:endParaRPr lang="fr-FR"/>
+          </a:p>
+        </p:txBody>
+      </p:sp>
+      <p:sp>
+        <p:nvSpPr>
+          <p:cNvPr id="19" name="TextBox 18"/>
+          <p:cNvSpPr txBox="1"/>
+          <p:nvPr/>
+        </p:nvSpPr>
+        <p:spPr>
+          <a:xfrm>
+            <a:off x="467544" y="2420888"/>
+            <a:ext cx="8208912" cy="3046988"/>
+          </a:xfrm>
+          <a:prstGeom prst="rect">
+            <a:avLst/>
+          </a:prstGeom>
+          <a:noFill/>
+        </p:spPr>
+        <p:txBody>
+          <a:bodyPr wrap="square" rtlCol="0">
+            <a:spAutoFit/>
+          </a:bodyPr>
+          <a:lstStyle/>
+          <a:p>
+            <a:pPr marL="0" lvl="2">
+              <a:buFont typeface="Arial" pitchFamily="34" charset="0"/>
+              <a:buChar char="•"/>
+            </a:pPr>
+            <a:r>
+              <a:rPr lang="fr-FR" sz="3200" dirty="0" smtClean="0"/>
+              <a:t>    Application des méthodes Agile </a:t>
+            </a:r>
+          </a:p>
+          <a:p>
+            <a:pPr marL="0" lvl="2"/>
+            <a:r>
+              <a:rPr lang="fr-FR" sz="3200" dirty="0" smtClean="0"/>
+              <a:t>	(</a:t>
+            </a:r>
+            <a:r>
+              <a:rPr lang="fr-FR" sz="3200" dirty="0" err="1" smtClean="0"/>
+              <a:t>Scrum</a:t>
+            </a:r>
+            <a:r>
+              <a:rPr lang="fr-FR" sz="3200" dirty="0" smtClean="0"/>
+              <a:t> et XP)</a:t>
+            </a:r>
+          </a:p>
+          <a:p>
+            <a:pPr>
+              <a:buFont typeface="Arial" pitchFamily="34" charset="0"/>
+              <a:buChar char="•"/>
+            </a:pPr>
+            <a:r>
+              <a:rPr lang="fr-FR" sz="3200" dirty="0" smtClean="0"/>
+              <a:t>    Utilisation d’un SVN</a:t>
+            </a:r>
+          </a:p>
+          <a:p>
+            <a:pPr lvl="1"/>
+            <a:r>
+              <a:rPr lang="fr-FR" sz="3200" dirty="0" smtClean="0"/>
+              <a:t>	 (Google code)</a:t>
+            </a:r>
+          </a:p>
+          <a:p>
+            <a:pPr>
+              <a:buFont typeface="Arial" pitchFamily="34" charset="0"/>
+              <a:buChar char="•"/>
+            </a:pPr>
+            <a:r>
+              <a:rPr lang="fr-FR" sz="3200" dirty="0" smtClean="0"/>
+              <a:t>    Partage des documents</a:t>
+            </a:r>
+          </a:p>
+          <a:p>
+            <a:pPr lvl="1"/>
+            <a:r>
+              <a:rPr lang="fr-FR" sz="3200" dirty="0" smtClean="0"/>
+              <a:t>	 (Google doc)</a:t>
+            </a:r>
+          </a:p>
+        </p:txBody>
+      </p:sp>
+    </p:spTree>
+    <p:extLst>
+      <p:ext uri="{BB962C8B-B14F-4D97-AF65-F5344CB8AC3E}">
+        <p14:creationId xmlns:p14="http://schemas.microsoft.com/office/powerpoint/2010/main" val="3741159515"/>
+      </p:ext>
+    </p:extLst>
+  </p:cSld>
+  <p:clrMapOvr>
+    <a:masterClrMapping/>
+  </p:clrMapOvr>
+  <mc:AlternateContent xmlns:mc="http://schemas.openxmlformats.org/markup-compatibility/2006" xmlns:p14="http://schemas.microsoft.com/office/powerpoint/2010/main">
+    <mc:Choice Requires="p14">
+      <p:transition spd="med">
+        <p14:gallery dir="l"/>
+      </p:transition>
+    </mc:Choice>
+    <mc:Fallback xmlns="">
+      <p:transition spd="med">
+        <p:fade/>
+      </p:transition>
+    </mc:Fallback>
+  </mc:AlternateContent>
+  <p:timing>
+    <p:tnLst>
+      <p:par>
+        <p:cTn id="1" dur="indefinite" restart="never" nodeType="tmRoot"/>
+      </p:par>
+    </p:tnLst>
+  </p:timing>
+</p:sld>
+</file>
+
+<file path=ppt/slides/slide19.xml><?xml version="1.0" encoding="utf-8"?>
+<p:sld xmlns:a="http://schemas.openxmlformats.org/drawingml/2006/main" xmlns:r="http://schemas.openxmlformats.org/officeDocument/2006/relationships" xmlns:p="http://schemas.openxmlformats.org/presentationml/2006/main">
+  <p:cSld>
+    <p:spTree>
+      <p:nvGrpSpPr>
+        <p:cNvPr id="1" name=""/>
+        <p:cNvGrpSpPr/>
+        <p:nvPr/>
+      </p:nvGrpSpPr>
+      <p:grpSpPr>
+        <a:xfrm>
+          <a:off x="0" y="0"/>
+          <a:ext cx="0" cy="0"/>
+          <a:chOff x="0" y="0"/>
+          <a:chExt cx="0" cy="0"/>
+        </a:xfrm>
+      </p:grpSpPr>
+      <p:sp>
+        <p:nvSpPr>
+          <p:cNvPr id="3074" name="Titre 1"/>
+          <p:cNvSpPr>
+            <a:spLocks noGrp="1"/>
+          </p:cNvSpPr>
+          <p:nvPr>
+            <p:ph type="title"/>
+          </p:nvPr>
+        </p:nvSpPr>
+        <p:spPr>
+          <a:xfrm>
+            <a:off x="457200" y="773832"/>
+            <a:ext cx="8229600" cy="1143000"/>
+          </a:xfrm>
+        </p:spPr>
+        <p:txBody>
+          <a:bodyPr/>
+          <a:lstStyle/>
+          <a:p>
+            <a:r>
+              <a:rPr lang="fr-FR" dirty="0" smtClean="0"/>
+              <a:t>Avancement du projet</a:t>
+            </a:r>
+          </a:p>
+        </p:txBody>
+      </p:sp>
+      <p:pic>
+        <p:nvPicPr>
+          <p:cNvPr id="3076" name="Image 4"/>
+          <p:cNvPicPr>
+            <a:picLocks noChangeAspect="1"/>
+          </p:cNvPicPr>
+          <p:nvPr/>
+        </p:nvPicPr>
+        <p:blipFill>
+          <a:blip r:embed="rId3" cstate="print"/>
+          <a:srcRect/>
+          <a:stretch>
+            <a:fillRect/>
+          </a:stretch>
+        </p:blipFill>
+        <p:spPr bwMode="auto">
+          <a:xfrm>
+            <a:off x="0" y="0"/>
+            <a:ext cx="9144000" cy="646113"/>
+          </a:xfrm>
+          <a:prstGeom prst="rect">
+            <a:avLst/>
+          </a:prstGeom>
+          <a:noFill/>
+          <a:ln w="9525">
+            <a:noFill/>
+            <a:miter lim="800000"/>
+            <a:headEnd/>
+            <a:tailEnd/>
+          </a:ln>
+        </p:spPr>
+      </p:pic>
+      <p:sp>
+        <p:nvSpPr>
+          <p:cNvPr id="2" name="Espace réservé du numéro de diapositive 1"/>
+          <p:cNvSpPr>
+            <a:spLocks noGrp="1"/>
+          </p:cNvSpPr>
+          <p:nvPr>
+            <p:ph type="sldNum" sz="quarter" idx="12"/>
+          </p:nvPr>
+        </p:nvSpPr>
+        <p:spPr/>
+        <p:txBody>
+          <a:bodyPr/>
+          <a:lstStyle/>
+          <a:p>
+            <a:pPr>
+              <a:defRPr/>
+            </a:pPr>
+            <a:fld id="{CEE9F434-548C-4338-8DF1-58B3EAFD3701}" type="slidenum">
+              <a:rPr lang="fr-FR" smtClean="0"/>
+              <a:pPr>
+                <a:defRPr/>
+              </a:pPr>
+              <a:t>19</a:t>
             </a:fld>
             <a:endParaRPr lang="fr-FR"/>
           </a:p>
@@ -7818,7 +8152,217 @@
 </p:sld>
 </file>
 
-<file path=ppt/slides/slide19.xml><?xml version="1.0" encoding="utf-8"?>
+<file path=ppt/slides/slide2.xml><?xml version="1.0" encoding="utf-8"?>
+<p:sld xmlns:a="http://schemas.openxmlformats.org/drawingml/2006/main" xmlns:r="http://schemas.openxmlformats.org/officeDocument/2006/relationships" xmlns:p="http://schemas.openxmlformats.org/presentationml/2006/main">
+  <p:cSld>
+    <p:spTree>
+      <p:nvGrpSpPr>
+        <p:cNvPr id="1" name=""/>
+        <p:cNvGrpSpPr/>
+        <p:nvPr/>
+      </p:nvGrpSpPr>
+      <p:grpSpPr>
+        <a:xfrm>
+          <a:off x="0" y="0"/>
+          <a:ext cx="0" cy="0"/>
+          <a:chOff x="0" y="0"/>
+          <a:chExt cx="0" cy="0"/>
+        </a:xfrm>
+      </p:grpSpPr>
+      <p:sp>
+        <p:nvSpPr>
+          <p:cNvPr id="3074" name="Titre 1"/>
+          <p:cNvSpPr>
+            <a:spLocks noGrp="1"/>
+          </p:cNvSpPr>
+          <p:nvPr>
+            <p:ph type="title"/>
+          </p:nvPr>
+        </p:nvSpPr>
+        <p:spPr>
+          <a:xfrm>
+            <a:off x="457200" y="773832"/>
+            <a:ext cx="8229600" cy="1143000"/>
+          </a:xfrm>
+        </p:spPr>
+        <p:txBody>
+          <a:bodyPr/>
+          <a:lstStyle/>
+          <a:p>
+            <a:r>
+              <a:rPr lang="fr-FR" dirty="0" smtClean="0"/>
+              <a:t>Plan</a:t>
+            </a:r>
+          </a:p>
+        </p:txBody>
+      </p:sp>
+      <p:sp>
+        <p:nvSpPr>
+          <p:cNvPr id="3075" name="Espace réservé du contenu 2"/>
+          <p:cNvSpPr>
+            <a:spLocks noGrp="1"/>
+          </p:cNvSpPr>
+          <p:nvPr>
+            <p:ph idx="1"/>
+          </p:nvPr>
+        </p:nvSpPr>
+        <p:spPr>
+          <a:xfrm>
+            <a:off x="457200" y="1600200"/>
+            <a:ext cx="8229600" cy="5141168"/>
+          </a:xfrm>
+        </p:spPr>
+        <p:txBody>
+          <a:bodyPr>
+            <a:normAutofit/>
+          </a:bodyPr>
+          <a:lstStyle/>
+          <a:p>
+            <a:pPr>
+              <a:lnSpc>
+                <a:spcPct val="170000"/>
+              </a:lnSpc>
+            </a:pPr>
+            <a:r>
+              <a:rPr lang="fr-FR" dirty="0" smtClean="0"/>
+              <a:t>Le contexte</a:t>
+            </a:r>
+          </a:p>
+          <a:p>
+            <a:pPr>
+              <a:lnSpc>
+                <a:spcPct val="170000"/>
+              </a:lnSpc>
+            </a:pPr>
+            <a:r>
+              <a:rPr lang="fr-FR" dirty="0" smtClean="0"/>
+              <a:t>Le projet</a:t>
+            </a:r>
+          </a:p>
+          <a:p>
+            <a:pPr>
+              <a:lnSpc>
+                <a:spcPct val="170000"/>
+              </a:lnSpc>
+            </a:pPr>
+            <a:r>
+              <a:rPr lang="fr-FR" dirty="0" smtClean="0"/>
+              <a:t>Conception</a:t>
+            </a:r>
+          </a:p>
+          <a:p>
+            <a:pPr>
+              <a:lnSpc>
+                <a:spcPct val="170000"/>
+              </a:lnSpc>
+            </a:pPr>
+            <a:r>
+              <a:rPr lang="fr-FR" dirty="0" smtClean="0"/>
+              <a:t>Démonstration</a:t>
+            </a:r>
+          </a:p>
+          <a:p>
+            <a:pPr>
+              <a:lnSpc>
+                <a:spcPct val="170000"/>
+              </a:lnSpc>
+            </a:pPr>
+            <a:r>
+              <a:rPr lang="fr-FR" dirty="0" smtClean="0"/>
+              <a:t>Gestion de projet</a:t>
+            </a:r>
+          </a:p>
+        </p:txBody>
+      </p:sp>
+      <p:pic>
+        <p:nvPicPr>
+          <p:cNvPr id="3076" name="Image 4"/>
+          <p:cNvPicPr>
+            <a:picLocks noChangeAspect="1"/>
+          </p:cNvPicPr>
+          <p:nvPr/>
+        </p:nvPicPr>
+        <p:blipFill>
+          <a:blip r:embed="rId3" cstate="print"/>
+          <a:srcRect/>
+          <a:stretch>
+            <a:fillRect/>
+          </a:stretch>
+        </p:blipFill>
+        <p:spPr bwMode="auto">
+          <a:xfrm>
+            <a:off x="0" y="0"/>
+            <a:ext cx="9144000" cy="646113"/>
+          </a:xfrm>
+          <a:prstGeom prst="rect">
+            <a:avLst/>
+          </a:prstGeom>
+          <a:noFill/>
+          <a:ln w="9525">
+            <a:noFill/>
+            <a:miter lim="800000"/>
+            <a:headEnd/>
+            <a:tailEnd/>
+          </a:ln>
+        </p:spPr>
+      </p:pic>
+      <p:sp>
+        <p:nvSpPr>
+          <p:cNvPr id="2" name="Espace réservé du numéro de diapositive 1"/>
+          <p:cNvSpPr>
+            <a:spLocks noGrp="1"/>
+          </p:cNvSpPr>
+          <p:nvPr>
+            <p:ph type="sldNum" sz="quarter" idx="12"/>
+          </p:nvPr>
+        </p:nvSpPr>
+        <p:spPr/>
+        <p:txBody>
+          <a:bodyPr/>
+          <a:lstStyle/>
+          <a:p>
+            <a:pPr>
+              <a:defRPr/>
+            </a:pPr>
+            <a:fld id="{CEE9F434-548C-4338-8DF1-58B3EAFD3701}" type="slidenum">
+              <a:rPr lang="fr-FR" smtClean="0"/>
+              <a:pPr>
+                <a:defRPr/>
+              </a:pPr>
+              <a:t>2</a:t>
+            </a:fld>
+            <a:endParaRPr lang="fr-FR"/>
+          </a:p>
+        </p:txBody>
+      </p:sp>
+    </p:spTree>
+  </p:cSld>
+  <p:clrMapOvr>
+    <a:masterClrMapping/>
+  </p:clrMapOvr>
+  <mc:AlternateContent xmlns:mc="http://schemas.openxmlformats.org/markup-compatibility/2006" xmlns:p14="http://schemas.microsoft.com/office/powerpoint/2010/main">
+    <mc:Choice Requires="p14">
+      <p:transition spd="med">
+        <p14:gallery dir="l"/>
+      </p:transition>
+    </mc:Choice>
+    <mc:Fallback xmlns="">
+      <p:transition spd="med">
+        <p:fade/>
+      </p:transition>
+    </mc:Fallback>
+  </mc:AlternateContent>
+  <p:timing>
+    <p:tnLst>
+      <p:par>
+        <p:cTn id="1" dur="indefinite" restart="never" nodeType="tmRoot"/>
+      </p:par>
+    </p:tnLst>
+  </p:timing>
+</p:sld>
+</file>
+
+<file path=ppt/slides/slide20.xml><?xml version="1.0" encoding="utf-8"?>
 <p:sld xmlns:a="http://schemas.openxmlformats.org/drawingml/2006/main" xmlns:r="http://schemas.openxmlformats.org/officeDocument/2006/relationships" xmlns:p="http://schemas.openxmlformats.org/presentationml/2006/main">
   <p:cSld>
     <p:spTree>
@@ -7899,216 +8443,6 @@
           </a:ln>
         </p:spPr>
       </p:pic>
-    </p:spTree>
-  </p:cSld>
-  <p:clrMapOvr>
-    <a:masterClrMapping/>
-  </p:clrMapOvr>
-  <mc:AlternateContent xmlns:mc="http://schemas.openxmlformats.org/markup-compatibility/2006" xmlns:p14="http://schemas.microsoft.com/office/powerpoint/2010/main">
-    <mc:Choice Requires="p14">
-      <p:transition spd="med">
-        <p14:gallery dir="l"/>
-      </p:transition>
-    </mc:Choice>
-    <mc:Fallback xmlns="">
-      <p:transition spd="med">
-        <p:fade/>
-      </p:transition>
-    </mc:Fallback>
-  </mc:AlternateContent>
-  <p:timing>
-    <p:tnLst>
-      <p:par>
-        <p:cTn id="1" dur="indefinite" restart="never" nodeType="tmRoot"/>
-      </p:par>
-    </p:tnLst>
-  </p:timing>
-</p:sld>
-</file>
-
-<file path=ppt/slides/slide2.xml><?xml version="1.0" encoding="utf-8"?>
-<p:sld xmlns:a="http://schemas.openxmlformats.org/drawingml/2006/main" xmlns:r="http://schemas.openxmlformats.org/officeDocument/2006/relationships" xmlns:p="http://schemas.openxmlformats.org/presentationml/2006/main">
-  <p:cSld>
-    <p:spTree>
-      <p:nvGrpSpPr>
-        <p:cNvPr id="1" name=""/>
-        <p:cNvGrpSpPr/>
-        <p:nvPr/>
-      </p:nvGrpSpPr>
-      <p:grpSpPr>
-        <a:xfrm>
-          <a:off x="0" y="0"/>
-          <a:ext cx="0" cy="0"/>
-          <a:chOff x="0" y="0"/>
-          <a:chExt cx="0" cy="0"/>
-        </a:xfrm>
-      </p:grpSpPr>
-      <p:sp>
-        <p:nvSpPr>
-          <p:cNvPr id="3074" name="Titre 1"/>
-          <p:cNvSpPr>
-            <a:spLocks noGrp="1"/>
-          </p:cNvSpPr>
-          <p:nvPr>
-            <p:ph type="title"/>
-          </p:nvPr>
-        </p:nvSpPr>
-        <p:spPr>
-          <a:xfrm>
-            <a:off x="457200" y="773832"/>
-            <a:ext cx="8229600" cy="1143000"/>
-          </a:xfrm>
-        </p:spPr>
-        <p:txBody>
-          <a:bodyPr/>
-          <a:lstStyle/>
-          <a:p>
-            <a:r>
-              <a:rPr lang="fr-FR" dirty="0" smtClean="0"/>
-              <a:t>Plan</a:t>
-            </a:r>
-          </a:p>
-        </p:txBody>
-      </p:sp>
-      <p:sp>
-        <p:nvSpPr>
-          <p:cNvPr id="3075" name="Espace réservé du contenu 2"/>
-          <p:cNvSpPr>
-            <a:spLocks noGrp="1"/>
-          </p:cNvSpPr>
-          <p:nvPr>
-            <p:ph idx="1"/>
-          </p:nvPr>
-        </p:nvSpPr>
-        <p:spPr>
-          <a:xfrm>
-            <a:off x="457200" y="1600200"/>
-            <a:ext cx="8229600" cy="5141168"/>
-          </a:xfrm>
-        </p:spPr>
-        <p:txBody>
-          <a:bodyPr>
-            <a:normAutofit/>
-          </a:bodyPr>
-          <a:lstStyle/>
-          <a:p>
-            <a:pPr>
-              <a:lnSpc>
-                <a:spcPct val="170000"/>
-              </a:lnSpc>
-            </a:pPr>
-            <a:r>
-              <a:rPr lang="fr-FR" dirty="0" smtClean="0"/>
-              <a:t>Le contexte</a:t>
-            </a:r>
-          </a:p>
-          <a:p>
-            <a:pPr>
-              <a:lnSpc>
-                <a:spcPct val="170000"/>
-              </a:lnSpc>
-            </a:pPr>
-            <a:r>
-              <a:rPr lang="fr-FR" dirty="0" smtClean="0"/>
-              <a:t>Le projet</a:t>
-            </a:r>
-          </a:p>
-          <a:p>
-            <a:pPr>
-              <a:lnSpc>
-                <a:spcPct val="170000"/>
-              </a:lnSpc>
-            </a:pPr>
-            <a:r>
-              <a:rPr lang="fr-FR" dirty="0" smtClean="0"/>
-              <a:t>Conception</a:t>
-            </a:r>
-          </a:p>
-          <a:p>
-            <a:pPr>
-              <a:lnSpc>
-                <a:spcPct val="170000"/>
-              </a:lnSpc>
-            </a:pPr>
-            <a:r>
-              <a:rPr lang="fr-FR" dirty="0" smtClean="0"/>
-              <a:t>Démonstration</a:t>
-            </a:r>
-          </a:p>
-          <a:p>
-            <a:pPr>
-              <a:lnSpc>
-                <a:spcPct val="170000"/>
-              </a:lnSpc>
-            </a:pPr>
-            <a:r>
-              <a:rPr lang="fr-FR" dirty="0" smtClean="0"/>
-              <a:t>Gestion de projet</a:t>
-            </a:r>
-          </a:p>
-        </p:txBody>
-      </p:sp>
-      <p:pic>
-        <p:nvPicPr>
-          <p:cNvPr id="3076" name="Image 4"/>
-          <p:cNvPicPr>
-            <a:picLocks noChangeAspect="1"/>
-          </p:cNvPicPr>
-          <p:nvPr/>
-        </p:nvPicPr>
-        <p:blipFill>
-          <a:blip r:embed="rId3" cstate="print"/>
-          <a:srcRect/>
-          <a:stretch>
-            <a:fillRect/>
-          </a:stretch>
-        </p:blipFill>
-        <p:spPr bwMode="auto">
-          <a:xfrm>
-            <a:off x="0" y="0"/>
-            <a:ext cx="9144000" cy="646113"/>
-          </a:xfrm>
-          <a:prstGeom prst="rect">
-            <a:avLst/>
-          </a:prstGeom>
-          <a:noFill/>
-          <a:ln w="9525">
-            <a:noFill/>
-            <a:miter lim="800000"/>
-            <a:headEnd/>
-            <a:tailEnd/>
-          </a:ln>
-        </p:spPr>
-      </p:pic>
-      <p:sp>
-        <p:nvSpPr>
-          <p:cNvPr id="2" name="Espace réservé du numéro de diapositive 1"/>
-          <p:cNvSpPr>
-            <a:spLocks noGrp="1"/>
-          </p:cNvSpPr>
-          <p:nvPr>
-            <p:ph type="sldNum" sz="quarter" idx="12"/>
-          </p:nvPr>
-        </p:nvSpPr>
-        <p:spPr/>
-        <p:txBody>
-          <a:bodyPr/>
-          <a:lstStyle/>
-          <a:p>
-            <a:pPr>
-              <a:defRPr/>
-            </a:pPr>
-            <a:fld id="{CEE9F434-548C-4338-8DF1-58B3EAFD3701}" type="slidenum">
-              <a:rPr lang="fr-FR" smtClean="0"/>
-              <a:pPr>
-                <a:defRPr/>
-              </a:pPr>
-              <a:t>2</a:t>
-            </a:fld>
-            <a:endParaRPr lang="fr-FR"/>
-          </a:p>
-        </p:txBody>
-      </p:sp>
     </p:spTree>
   </p:cSld>
   <p:clrMapOvr>
@@ -9096,8 +9430,9 @@
           <a:p>
             <a:r>
               <a:rPr lang="fr-FR" dirty="0" smtClean="0"/>
-              <a:t>Fonctionnalités</a:t>
-            </a:r>
+              <a:t>Besoins fonctionnels</a:t>
+            </a:r>
+            <a:endParaRPr lang="fr-FR" dirty="0" smtClean="0"/>
           </a:p>
         </p:txBody>
       </p:sp>
@@ -9128,7 +9463,59 @@
                 <a:spcPct val="170000"/>
               </a:lnSpc>
             </a:pPr>
-            <a:endParaRPr lang="fr-FR" dirty="0" smtClean="0"/>
+            <a:r>
+              <a:rPr lang="fr-FR" dirty="0" smtClean="0"/>
+              <a:t>Gestion des zones / catégories / évènements</a:t>
+            </a:r>
+          </a:p>
+          <a:p>
+            <a:pPr>
+              <a:lnSpc>
+                <a:spcPct val="170000"/>
+              </a:lnSpc>
+            </a:pPr>
+            <a:r>
+              <a:rPr lang="fr-FR" dirty="0" smtClean="0"/>
+              <a:t>Inscription &amp; modification des accréditations</a:t>
+            </a:r>
+          </a:p>
+          <a:p>
+            <a:pPr>
+              <a:lnSpc>
+                <a:spcPct val="170000"/>
+              </a:lnSpc>
+            </a:pPr>
+            <a:r>
+              <a:rPr lang="fr-FR" dirty="0" smtClean="0"/>
+              <a:t>Import de photos (Fichier ou webcam)</a:t>
+            </a:r>
+          </a:p>
+          <a:p>
+            <a:pPr>
+              <a:lnSpc>
+                <a:spcPct val="170000"/>
+              </a:lnSpc>
+            </a:pPr>
+            <a:r>
+              <a:rPr lang="fr-FR" dirty="0" smtClean="0"/>
+              <a:t>Export des données en Excel</a:t>
+            </a:r>
+          </a:p>
+          <a:p>
+            <a:pPr>
+              <a:lnSpc>
+                <a:spcPct val="170000"/>
+              </a:lnSpc>
+            </a:pPr>
+            <a:r>
+              <a:rPr lang="fr-FR" dirty="0" smtClean="0"/>
+              <a:t>Impression des </a:t>
+            </a:r>
+            <a:r>
+              <a:rPr lang="fr-FR" dirty="0" err="1" smtClean="0"/>
+              <a:t>pass</a:t>
+            </a:r>
+            <a:endParaRPr lang="fr-FR" dirty="0"/>
           </a:p>
         </p:txBody>
       </p:sp>
@@ -9218,7 +9605,335 @@
   <p:timing>
     <p:tnLst>
       <p:par>
-        <p:cTn id="1" dur="indefinite" restart="never" nodeType="tmRoot"/>
+        <p:cTn id="1" dur="indefinite" restart="never" nodeType="tmRoot">
+          <p:childTnLst>
+            <p:seq concurrent="1" nextAc="seek">
+              <p:cTn id="2" dur="indefinite" nodeType="mainSeq">
+                <p:childTnLst>
+                  <p:par>
+                    <p:cTn id="3" fill="hold">
+                      <p:stCondLst>
+                        <p:cond delay="indefinite"/>
+                      </p:stCondLst>
+                      <p:childTnLst>
+                        <p:par>
+                          <p:cTn id="4" fill="hold">
+                            <p:stCondLst>
+                              <p:cond delay="0"/>
+                            </p:stCondLst>
+                            <p:childTnLst>
+                              <p:par>
+                                <p:cTn id="5" presetID="10" presetClass="entr" presetSubtype="0" fill="hold" nodeType="clickEffect">
+                                  <p:stCondLst>
+                                    <p:cond delay="0"/>
+                                  </p:stCondLst>
+                                  <p:childTnLst>
+                                    <p:set>
+                                      <p:cBhvr>
+                                        <p:cTn id="6" dur="1" fill="hold">
+                                          <p:stCondLst>
+                                            <p:cond delay="0"/>
+                                          </p:stCondLst>
+                                        </p:cTn>
+                                        <p:tgtEl>
+                                          <p:spTgt spid="3075">
+                                            <p:txEl>
+                                              <p:pRg st="0" end="0"/>
+                                            </p:txEl>
+                                          </p:spTgt>
+                                        </p:tgtEl>
+                                        <p:attrNameLst>
+                                          <p:attrName>style.visibility</p:attrName>
+                                        </p:attrNameLst>
+                                      </p:cBhvr>
+                                      <p:to>
+                                        <p:strVal val="visible"/>
+                                      </p:to>
+                                    </p:set>
+                                    <p:animEffect transition="in" filter="fade">
+                                      <p:cBhvr>
+                                        <p:cTn id="7" dur="500"/>
+                                        <p:tgtEl>
+                                          <p:spTgt spid="3075">
+                                            <p:txEl>
+                                              <p:pRg st="0" end="0"/>
+                                            </p:txEl>
+                                          </p:spTgt>
+                                        </p:tgtEl>
+                                      </p:cBhvr>
+                                    </p:animEffect>
+                                  </p:childTnLst>
+                                </p:cTn>
+                              </p:par>
+                            </p:childTnLst>
+                          </p:cTn>
+                        </p:par>
+                      </p:childTnLst>
+                    </p:cTn>
+                  </p:par>
+                  <p:par>
+                    <p:cTn id="8" fill="hold">
+                      <p:stCondLst>
+                        <p:cond delay="indefinite"/>
+                      </p:stCondLst>
+                      <p:childTnLst>
+                        <p:par>
+                          <p:cTn id="9" fill="hold">
+                            <p:stCondLst>
+                              <p:cond delay="0"/>
+                            </p:stCondLst>
+                            <p:childTnLst>
+                              <p:par>
+                                <p:cTn id="10" presetID="10" presetClass="entr" presetSubtype="0" fill="hold" nodeType="clickEffect">
+                                  <p:stCondLst>
+                                    <p:cond delay="0"/>
+                                  </p:stCondLst>
+                                  <p:childTnLst>
+                                    <p:set>
+                                      <p:cBhvr>
+                                        <p:cTn id="11" dur="1" fill="hold">
+                                          <p:stCondLst>
+                                            <p:cond delay="0"/>
+                                          </p:stCondLst>
+                                        </p:cTn>
+                                        <p:tgtEl>
+                                          <p:spTgt spid="3075">
+                                            <p:txEl>
+                                              <p:pRg st="1" end="1"/>
+                                            </p:txEl>
+                                          </p:spTgt>
+                                        </p:tgtEl>
+                                        <p:attrNameLst>
+                                          <p:attrName>style.visibility</p:attrName>
+                                        </p:attrNameLst>
+                                      </p:cBhvr>
+                                      <p:to>
+                                        <p:strVal val="visible"/>
+                                      </p:to>
+                                    </p:set>
+                                    <p:animEffect transition="in" filter="fade">
+                                      <p:cBhvr>
+                                        <p:cTn id="12" dur="500"/>
+                                        <p:tgtEl>
+                                          <p:spTgt spid="3075">
+                                            <p:txEl>
+                                              <p:pRg st="1" end="1"/>
+                                            </p:txEl>
+                                          </p:spTgt>
+                                        </p:tgtEl>
+                                      </p:cBhvr>
+                                    </p:animEffect>
+                                  </p:childTnLst>
+                                </p:cTn>
+                              </p:par>
+                            </p:childTnLst>
+                          </p:cTn>
+                        </p:par>
+                      </p:childTnLst>
+                    </p:cTn>
+                  </p:par>
+                  <p:par>
+                    <p:cTn id="13" fill="hold">
+                      <p:stCondLst>
+                        <p:cond delay="indefinite"/>
+                      </p:stCondLst>
+                      <p:childTnLst>
+                        <p:par>
+                          <p:cTn id="14" fill="hold">
+                            <p:stCondLst>
+                              <p:cond delay="0"/>
+                            </p:stCondLst>
+                            <p:childTnLst>
+                              <p:par>
+                                <p:cTn id="15" presetID="10" presetClass="entr" presetSubtype="0" fill="hold" nodeType="clickEffect">
+                                  <p:stCondLst>
+                                    <p:cond delay="0"/>
+                                  </p:stCondLst>
+                                  <p:childTnLst>
+                                    <p:set>
+                                      <p:cBhvr>
+                                        <p:cTn id="16" dur="1" fill="hold">
+                                          <p:stCondLst>
+                                            <p:cond delay="0"/>
+                                          </p:stCondLst>
+                                        </p:cTn>
+                                        <p:tgtEl>
+                                          <p:spTgt spid="3075">
+                                            <p:txEl>
+                                              <p:pRg st="2" end="2"/>
+                                            </p:txEl>
+                                          </p:spTgt>
+                                        </p:tgtEl>
+                                        <p:attrNameLst>
+                                          <p:attrName>style.visibility</p:attrName>
+                                        </p:attrNameLst>
+                                      </p:cBhvr>
+                                      <p:to>
+                                        <p:strVal val="visible"/>
+                                      </p:to>
+                                    </p:set>
+                                    <p:animEffect transition="in" filter="fade">
+                                      <p:cBhvr>
+                                        <p:cTn id="17" dur="500"/>
+                                        <p:tgtEl>
+                                          <p:spTgt spid="3075">
+                                            <p:txEl>
+                                              <p:pRg st="2" end="2"/>
+                                            </p:txEl>
+                                          </p:spTgt>
+                                        </p:tgtEl>
+                                      </p:cBhvr>
+                                    </p:animEffect>
+                                  </p:childTnLst>
+                                </p:cTn>
+                              </p:par>
+                            </p:childTnLst>
+                          </p:cTn>
+                        </p:par>
+                      </p:childTnLst>
+                    </p:cTn>
+                  </p:par>
+                  <p:par>
+                    <p:cTn id="18" fill="hold">
+                      <p:stCondLst>
+                        <p:cond delay="indefinite"/>
+                      </p:stCondLst>
+                      <p:childTnLst>
+                        <p:par>
+                          <p:cTn id="19" fill="hold">
+                            <p:stCondLst>
+                              <p:cond delay="0"/>
+                            </p:stCondLst>
+                            <p:childTnLst>
+                              <p:par>
+                                <p:cTn id="20" presetID="10" presetClass="entr" presetSubtype="0" fill="hold" nodeType="clickEffect">
+                                  <p:stCondLst>
+                                    <p:cond delay="0"/>
+                                  </p:stCondLst>
+                                  <p:childTnLst>
+                                    <p:set>
+                                      <p:cBhvr>
+                                        <p:cTn id="21" dur="1" fill="hold">
+                                          <p:stCondLst>
+                                            <p:cond delay="0"/>
+                                          </p:stCondLst>
+                                        </p:cTn>
+                                        <p:tgtEl>
+                                          <p:spTgt spid="3075">
+                                            <p:txEl>
+                                              <p:pRg st="3" end="3"/>
+                                            </p:txEl>
+                                          </p:spTgt>
+                                        </p:tgtEl>
+                                        <p:attrNameLst>
+                                          <p:attrName>style.visibility</p:attrName>
+                                        </p:attrNameLst>
+                                      </p:cBhvr>
+                                      <p:to>
+                                        <p:strVal val="visible"/>
+                                      </p:to>
+                                    </p:set>
+                                    <p:animEffect transition="in" filter="fade">
+                                      <p:cBhvr>
+                                        <p:cTn id="22" dur="500"/>
+                                        <p:tgtEl>
+                                          <p:spTgt spid="3075">
+                                            <p:txEl>
+                                              <p:pRg st="3" end="3"/>
+                                            </p:txEl>
+                                          </p:spTgt>
+                                        </p:tgtEl>
+                                      </p:cBhvr>
+                                    </p:animEffect>
+                                  </p:childTnLst>
+                                </p:cTn>
+                              </p:par>
+                            </p:childTnLst>
+                          </p:cTn>
+                        </p:par>
+                      </p:childTnLst>
+                    </p:cTn>
+                  </p:par>
+                  <p:par>
+                    <p:cTn id="23" fill="hold">
+                      <p:stCondLst>
+                        <p:cond delay="indefinite"/>
+                      </p:stCondLst>
+                      <p:childTnLst>
+                        <p:par>
+                          <p:cTn id="24" fill="hold">
+                            <p:stCondLst>
+                              <p:cond delay="0"/>
+                            </p:stCondLst>
+                            <p:childTnLst>
+                              <p:par>
+                                <p:cTn id="25" presetID="10" presetClass="entr" presetSubtype="0" fill="hold" nodeType="clickEffect">
+                                  <p:stCondLst>
+                                    <p:cond delay="0"/>
+                                  </p:stCondLst>
+                                  <p:childTnLst>
+                                    <p:set>
+                                      <p:cBhvr>
+                                        <p:cTn id="26" dur="1" fill="hold">
+                                          <p:stCondLst>
+                                            <p:cond delay="0"/>
+                                          </p:stCondLst>
+                                        </p:cTn>
+                                        <p:tgtEl>
+                                          <p:spTgt spid="3075">
+                                            <p:txEl>
+                                              <p:pRg st="4" end="4"/>
+                                            </p:txEl>
+                                          </p:spTgt>
+                                        </p:tgtEl>
+                                        <p:attrNameLst>
+                                          <p:attrName>style.visibility</p:attrName>
+                                        </p:attrNameLst>
+                                      </p:cBhvr>
+                                      <p:to>
+                                        <p:strVal val="visible"/>
+                                      </p:to>
+                                    </p:set>
+                                    <p:animEffect transition="in" filter="fade">
+                                      <p:cBhvr>
+                                        <p:cTn id="27" dur="500"/>
+                                        <p:tgtEl>
+                                          <p:spTgt spid="3075">
+                                            <p:txEl>
+                                              <p:pRg st="4" end="4"/>
+                                            </p:txEl>
+                                          </p:spTgt>
+                                        </p:tgtEl>
+                                      </p:cBhvr>
+                                    </p:animEffect>
+                                  </p:childTnLst>
+                                </p:cTn>
+                              </p:par>
+                            </p:childTnLst>
+                          </p:cTn>
+                        </p:par>
+                      </p:childTnLst>
+                    </p:cTn>
+                  </p:par>
+                </p:childTnLst>
+              </p:cTn>
+              <p:prevCondLst>
+                <p:cond evt="onPrev" delay="0">
+                  <p:tgtEl>
+                    <p:sldTgt/>
+                  </p:tgtEl>
+                </p:cond>
+              </p:prevCondLst>
+              <p:nextCondLst>
+                <p:cond evt="onNext" delay="0">
+                  <p:tgtEl>
+                    <p:sldTgt/>
+                  </p:tgtEl>
+                </p:cond>
+              </p:nextCondLst>
+            </p:seq>
+          </p:childTnLst>
+        </p:cTn>
       </p:par>
     </p:tnLst>
   </p:timing>
@@ -9263,8 +9978,8 @@
           <a:lstStyle/>
           <a:p>
             <a:r>
-              <a:rPr lang="fr-FR" dirty="0" err="1" smtClean="0"/>
-              <a:t>Plop</a:t>
+              <a:rPr lang="fr-FR" dirty="0" smtClean="0"/>
+              <a:t>Besoins organisationnels</a:t>
             </a:r>
             <a:endParaRPr lang="fr-FR" dirty="0" smtClean="0"/>
           </a:p>
@@ -9297,6 +10012,31 @@
                 <a:spcPct val="170000"/>
               </a:lnSpc>
             </a:pPr>
+            <a:r>
+              <a:rPr lang="fr-FR" dirty="0" smtClean="0"/>
+              <a:t>Anticiper la charge de travail</a:t>
+            </a:r>
+          </a:p>
+          <a:p>
+            <a:endParaRPr lang="fr-FR" dirty="0" smtClean="0"/>
+          </a:p>
+          <a:p>
+            <a:pPr lvl="1"/>
+            <a:r>
+              <a:rPr lang="fr-FR" dirty="0" smtClean="0"/>
+              <a:t>Création &amp; gestion des évènements en amont par les organisateurs</a:t>
+            </a:r>
+          </a:p>
+          <a:p>
+            <a:pPr lvl="1"/>
+            <a:endParaRPr lang="fr-FR" dirty="0" smtClean="0"/>
+          </a:p>
+          <a:p>
+            <a:pPr lvl="1"/>
+            <a:r>
+              <a:rPr lang="fr-FR" dirty="0" smtClean="0"/>
+              <a:t>Création d’un accès web pour une pré-inscription des visiteurs</a:t>
+            </a:r>
             <a:endParaRPr lang="fr-FR" dirty="0" smtClean="0"/>
           </a:p>
         </p:txBody>
@@ -9387,7 +10127,134 @@
   <p:timing>
     <p:tnLst>
       <p:par>
-        <p:cTn id="1" dur="indefinite" restart="never" nodeType="tmRoot"/>
+        <p:cTn id="1" dur="indefinite" restart="never" nodeType="tmRoot">
+          <p:childTnLst>
+            <p:seq concurrent="1" nextAc="seek">
+              <p:cTn id="2" dur="indefinite" nodeType="mainSeq">
+                <p:childTnLst>
+                  <p:par>
+                    <p:cTn id="3" fill="hold">
+                      <p:stCondLst>
+                        <p:cond delay="indefinite"/>
+                      </p:stCondLst>
+                      <p:childTnLst>
+                        <p:par>
+                          <p:cTn id="4" fill="hold">
+                            <p:stCondLst>
+                              <p:cond delay="0"/>
+                            </p:stCondLst>
+                            <p:childTnLst>
+                              <p:par>
+                                <p:cTn id="5" presetID="10" presetClass="entr" presetSubtype="0" fill="hold" nodeType="clickEffect">
+                                  <p:stCondLst>
+                                    <p:cond delay="0"/>
+                                  </p:stCondLst>
+                                  <p:childTnLst>
+                                    <p:set>
+                                      <p:cBhvr>
+                                        <p:cTn id="6" dur="1" fill="hold">
+                                          <p:stCondLst>
+                                            <p:cond delay="0"/>
+                                          </p:stCondLst>
+                                        </p:cTn>
+                                        <p:tgtEl>
+                                          <p:spTgt spid="3075">
+                                            <p:txEl>
+                                              <p:pRg st="2" end="2"/>
+                                            </p:txEl>
+                                          </p:spTgt>
+                                        </p:tgtEl>
+                                        <p:attrNameLst>
+                                          <p:attrName>style.visibility</p:attrName>
+                                        </p:attrNameLst>
+                                      </p:cBhvr>
+                                      <p:to>
+                                        <p:strVal val="visible"/>
+                                      </p:to>
+                                    </p:set>
+                                    <p:animEffect transition="in" filter="fade">
+                                      <p:cBhvr>
+                                        <p:cTn id="7" dur="500"/>
+                                        <p:tgtEl>
+                                          <p:spTgt spid="3075">
+                                            <p:txEl>
+                                              <p:pRg st="2" end="2"/>
+                                            </p:txEl>
+                                          </p:spTgt>
+                                        </p:tgtEl>
+                                      </p:cBhvr>
+                                    </p:animEffect>
+                                  </p:childTnLst>
+                                </p:cTn>
+                              </p:par>
+                              <p:par>
+                                <p:cTn id="8" presetID="10" presetClass="entr" presetSubtype="0" fill="hold" nodeType="withEffect">
+                                  <p:stCondLst>
+                                    <p:cond delay="0"/>
+                                  </p:stCondLst>
+                                  <p:childTnLst>
+                                    <p:set>
+                                      <p:cBhvr>
+                                        <p:cTn id="9" dur="1" fill="hold">
+                                          <p:stCondLst>
+                                            <p:cond delay="0"/>
+                                          </p:stCondLst>
+                                        </p:cTn>
+                                        <p:tgtEl>
+                                          <p:spTgt spid="3075">
+                                            <p:txEl>
+                                              <p:pRg st="4" end="4"/>
+                                            </p:txEl>
+                                          </p:spTgt>
+                                        </p:tgtEl>
+                                        <p:attrNameLst>
+                                          <p:attrName>style.visibility</p:attrName>
+                                        </p:attrNameLst>
+                                      </p:cBhvr>
+                                      <p:to>
+                                        <p:strVal val="visible"/>
+                                      </p:to>
+                                    </p:set>
+                                    <p:animEffect transition="in" filter="fade">
+                                      <p:cBhvr>
+                                        <p:cTn id="10" dur="500"/>
+                                        <p:tgtEl>
+                                          <p:spTgt spid="3075">
+                                            <p:txEl>
+                                              <p:pRg st="4" end="4"/>
+                                            </p:txEl>
+                                          </p:spTgt>
+                                        </p:tgtEl>
+                                      </p:cBhvr>
+                                    </p:animEffect>
+                                  </p:childTnLst>
+                                </p:cTn>
+                              </p:par>
+                            </p:childTnLst>
+                          </p:cTn>
+                        </p:par>
+                      </p:childTnLst>
+                    </p:cTn>
+                  </p:par>
+                </p:childTnLst>
+              </p:cTn>
+              <p:prevCondLst>
+                <p:cond evt="onPrev" delay="0">
+                  <p:tgtEl>
+                    <p:sldTgt/>
+                  </p:tgtEl>
+                </p:cond>
+              </p:prevCondLst>
+              <p:nextCondLst>
+                <p:cond evt="onNext" delay="0">
+                  <p:tgtEl>
+                    <p:sldTgt/>
+                  </p:tgtEl>
+                </p:cond>
+              </p:nextCondLst>
+            </p:seq>
+          </p:childTnLst>
+        </p:cTn>
       </p:par>
     </p:tnLst>
   </p:timing>
@@ -9433,8 +10300,9 @@
           <a:p>
             <a:r>
               <a:rPr lang="fr-FR" dirty="0" smtClean="0"/>
-              <a:t>Plan</a:t>
-            </a:r>
+              <a:t>Besoins organisationnels</a:t>
+            </a:r>
+            <a:endParaRPr lang="fr-FR" dirty="0" smtClean="0"/>
           </a:p>
         </p:txBody>
       </p:sp>
@@ -9456,7 +10324,7 @@
         </p:spPr>
         <p:txBody>
           <a:bodyPr>
-            <a:normAutofit/>
+            <a:normAutofit fontScale="92500"/>
           </a:bodyPr>
           <a:lstStyle/>
           <a:p>
@@ -9466,76 +10334,52 @@
               </a:lnSpc>
             </a:pPr>
             <a:r>
-              <a:rPr lang="fr-FR" dirty="0" smtClean="0">
-                <a:solidFill>
-                  <a:schemeClr val="bg1">
-                    <a:lumMod val="50000"/>
-                  </a:schemeClr>
-                </a:solidFill>
-              </a:rPr>
-              <a:t>Le contexte</a:t>
-            </a:r>
-          </a:p>
-          <a:p>
-            <a:pPr>
+              <a:rPr lang="fr-FR" dirty="0" smtClean="0"/>
+              <a:t>Simplifier le processus d’accréditation</a:t>
+            </a:r>
+          </a:p>
+          <a:p>
+            <a:pPr lvl="1">
               <a:lnSpc>
-                <a:spcPct val="170000"/>
+                <a:spcPct val="200000"/>
               </a:lnSpc>
             </a:pPr>
             <a:r>
-              <a:rPr lang="fr-FR" dirty="0" smtClean="0">
-                <a:solidFill>
-                  <a:schemeClr val="bg1">
-                    <a:lumMod val="50000"/>
-                  </a:schemeClr>
-                </a:solidFill>
-              </a:rPr>
-              <a:t>Le projet</a:t>
-            </a:r>
-          </a:p>
-          <a:p>
-            <a:pPr>
+              <a:rPr lang="fr-FR" dirty="0" smtClean="0"/>
+              <a:t>Inscription, validation &amp; impression simplifiés</a:t>
+            </a:r>
+          </a:p>
+          <a:p>
+            <a:pPr lvl="1">
               <a:lnSpc>
-                <a:spcPct val="170000"/>
+                <a:spcPct val="200000"/>
               </a:lnSpc>
             </a:pPr>
             <a:r>
               <a:rPr lang="fr-FR" dirty="0" smtClean="0"/>
-              <a:t>Conception</a:t>
-            </a:r>
-          </a:p>
-          <a:p>
-            <a:pPr>
+              <a:t>Accès rapide &amp; ergonomie soignée</a:t>
+            </a:r>
+          </a:p>
+          <a:p>
+            <a:pPr lvl="1">
               <a:lnSpc>
-                <a:spcPct val="170000"/>
+                <a:spcPct val="200000"/>
               </a:lnSpc>
             </a:pPr>
             <a:r>
-              <a:rPr lang="fr-FR" dirty="0" smtClean="0">
-                <a:solidFill>
-                  <a:schemeClr val="bg1">
-                    <a:lumMod val="50000"/>
-                  </a:schemeClr>
-                </a:solidFill>
-              </a:rPr>
-              <a:t>Démonstration</a:t>
-            </a:r>
-          </a:p>
-          <a:p>
-            <a:pPr>
+              <a:rPr lang="fr-FR" dirty="0" smtClean="0"/>
+              <a:t>Outils génériques d’exportation sous divers formats</a:t>
+            </a:r>
+          </a:p>
+          <a:p>
+            <a:pPr lvl="1">
               <a:lnSpc>
-                <a:spcPct val="170000"/>
+                <a:spcPct val="200000"/>
               </a:lnSpc>
             </a:pPr>
             <a:r>
-              <a:rPr lang="fr-FR" dirty="0" smtClean="0">
-                <a:solidFill>
-                  <a:schemeClr val="bg1">
-                    <a:lumMod val="50000"/>
-                  </a:schemeClr>
-                </a:solidFill>
-              </a:rPr>
-              <a:t>Gestion de projet</a:t>
+              <a:rPr lang="fr-FR" dirty="0" smtClean="0"/>
+              <a:t>Application non restreinte au seul cas de Courchevel</a:t>
             </a:r>
             <a:endParaRPr lang="fr-FR" dirty="0" smtClean="0"/>
           </a:p>
@@ -9605,7 +10449,7 @@
     </p:spTree>
     <p:extLst>
       <p:ext uri="{BB962C8B-B14F-4D97-AF65-F5344CB8AC3E}">
-        <p14:creationId xmlns:p14="http://schemas.microsoft.com/office/powerpoint/2010/main" val="2623020860"/>
+        <p14:creationId xmlns:p14="http://schemas.microsoft.com/office/powerpoint/2010/main" val="2426875742"/>
       </p:ext>
     </p:extLst>
   </p:cSld>
@@ -9627,7 +10471,220 @@
   <p:timing>
     <p:tnLst>
       <p:par>
-        <p:cTn id="1" dur="indefinite" restart="never" nodeType="tmRoot"/>
+        <p:cTn id="1" dur="indefinite" restart="never" nodeType="tmRoot">
+          <p:childTnLst>
+            <p:seq concurrent="1" nextAc="seek">
+              <p:cTn id="2" dur="indefinite" nodeType="mainSeq">
+                <p:childTnLst>
+                  <p:par>
+                    <p:cTn id="3" fill="hold">
+                      <p:stCondLst>
+                        <p:cond delay="indefinite"/>
+                      </p:stCondLst>
+                      <p:childTnLst>
+                        <p:par>
+                          <p:cTn id="4" fill="hold">
+                            <p:stCondLst>
+                              <p:cond delay="0"/>
+                            </p:stCondLst>
+                            <p:childTnLst>
+                              <p:par>
+                                <p:cTn id="5" presetID="10" presetClass="entr" presetSubtype="0" fill="hold" nodeType="clickEffect">
+                                  <p:stCondLst>
+                                    <p:cond delay="0"/>
+                                  </p:stCondLst>
+                                  <p:childTnLst>
+                                    <p:set>
+                                      <p:cBhvr>
+                                        <p:cTn id="6" dur="1" fill="hold">
+                                          <p:stCondLst>
+                                            <p:cond delay="0"/>
+                                          </p:stCondLst>
+                                        </p:cTn>
+                                        <p:tgtEl>
+                                          <p:spTgt spid="3075">
+                                            <p:txEl>
+                                              <p:pRg st="1" end="1"/>
+                                            </p:txEl>
+                                          </p:spTgt>
+                                        </p:tgtEl>
+                                        <p:attrNameLst>
+                                          <p:attrName>style.visibility</p:attrName>
+                                        </p:attrNameLst>
+                                      </p:cBhvr>
+                                      <p:to>
+                                        <p:strVal val="visible"/>
+                                      </p:to>
+                                    </p:set>
+                                    <p:animEffect transition="in" filter="fade">
+                                      <p:cBhvr>
+                                        <p:cTn id="7" dur="500"/>
+                                        <p:tgtEl>
+                                          <p:spTgt spid="3075">
+                                            <p:txEl>
+                                              <p:pRg st="1" end="1"/>
+                                            </p:txEl>
+                                          </p:spTgt>
+                                        </p:tgtEl>
+                                      </p:cBhvr>
+                                    </p:animEffect>
+                                  </p:childTnLst>
+                                </p:cTn>
+                              </p:par>
+                              <p:par>
+                                <p:cTn id="8" presetID="10" presetClass="entr" presetSubtype="0" fill="hold" nodeType="withEffect">
+                                  <p:stCondLst>
+                                    <p:cond delay="0"/>
+                                  </p:stCondLst>
+                                  <p:childTnLst>
+                                    <p:set>
+                                      <p:cBhvr>
+                                        <p:cTn id="9" dur="1" fill="hold">
+                                          <p:stCondLst>
+                                            <p:cond delay="0"/>
+                                          </p:stCondLst>
+                                        </p:cTn>
+                                        <p:tgtEl>
+                                          <p:spTgt spid="3075">
+                                            <p:txEl>
+                                              <p:pRg st="2" end="2"/>
+                                            </p:txEl>
+                                          </p:spTgt>
+                                        </p:tgtEl>
+                                        <p:attrNameLst>
+                                          <p:attrName>style.visibility</p:attrName>
+                                        </p:attrNameLst>
+                                      </p:cBhvr>
+                                      <p:to>
+                                        <p:strVal val="visible"/>
+                                      </p:to>
+                                    </p:set>
+                                    <p:animEffect transition="in" filter="fade">
+                                      <p:cBhvr>
+                                        <p:cTn id="10" dur="500"/>
+                                        <p:tgtEl>
+                                          <p:spTgt spid="3075">
+                                            <p:txEl>
+                                              <p:pRg st="2" end="2"/>
+                                            </p:txEl>
+                                          </p:spTgt>
+                                        </p:tgtEl>
+                                      </p:cBhvr>
+                                    </p:animEffect>
+                                  </p:childTnLst>
+                                </p:cTn>
+                              </p:par>
+                              <p:par>
+                                <p:cTn id="11" presetID="10" presetClass="entr" presetSubtype="0" fill="hold" nodeType="withEffect">
+                                  <p:stCondLst>
+                                    <p:cond delay="0"/>
+                                  </p:stCondLst>
+                                  <p:childTnLst>
+                                    <p:set>
+                                      <p:cBhvr>
+                                        <p:cTn id="12" dur="1" fill="hold">
+                                          <p:stCondLst>
+                                            <p:cond delay="0"/>
+                                          </p:stCondLst>
+                                        </p:cTn>
+                                        <p:tgtEl>
+                                          <p:spTgt spid="3075">
+                                            <p:txEl>
+                                              <p:pRg st="3" end="3"/>
+                                            </p:txEl>
+                                          </p:spTgt>
+                                        </p:tgtEl>
+                                        <p:attrNameLst>
+                                          <p:attrName>style.visibility</p:attrName>
+                                        </p:attrNameLst>
+                                      </p:cBhvr>
+                                      <p:to>
+                                        <p:strVal val="visible"/>
+                                      </p:to>
+                                    </p:set>
+                                    <p:animEffect transition="in" filter="fade">
+                                      <p:cBhvr>
+                                        <p:cTn id="13" dur="500"/>
+                                        <p:tgtEl>
+                                          <p:spTgt spid="3075">
+                                            <p:txEl>
+                                              <p:pRg st="3" end="3"/>
+                                            </p:txEl>
+                                          </p:spTgt>
+                                        </p:tgtEl>
+                                      </p:cBhvr>
+                                    </p:animEffect>
+                                  </p:childTnLst>
+                                </p:cTn>
+                              </p:par>
+                              <p:par>
+                                <p:cTn id="14" presetID="10" presetClass="entr" presetSubtype="0" fill="hold" nodeType="withEffect">
+                                  <p:stCondLst>
+                                    <p:cond delay="0"/>
+                                  </p:stCondLst>
+                                  <p:childTnLst>
+                                    <p:set>
+                                      <p:cBhvr>
+                                        <p:cTn id="15" dur="1" fill="hold">
+                                          <p:stCondLst>
+                                            <p:cond delay="0"/>
+                                          </p:stCondLst>
+                                        </p:cTn>
+                                        <p:tgtEl>
+                                          <p:spTgt spid="3075">
+                                            <p:txEl>
+                                              <p:pRg st="4" end="4"/>
+                                            </p:txEl>
+                                          </p:spTgt>
+                                        </p:tgtEl>
+                                        <p:attrNameLst>
+                                          <p:attrName>style.visibility</p:attrName>
+                                        </p:attrNameLst>
+                                      </p:cBhvr>
+                                      <p:to>
+                                        <p:strVal val="visible"/>
+                                      </p:to>
+                                    </p:set>
+                                    <p:animEffect transition="in" filter="fade">
+                                      <p:cBhvr>
+                                        <p:cTn id="16" dur="500"/>
+                                        <p:tgtEl>
+                                          <p:spTgt spid="3075">
+                                            <p:txEl>
+                                              <p:pRg st="4" end="4"/>
+                                            </p:txEl>
+                                          </p:spTgt>
+                                        </p:tgtEl>
+                                      </p:cBhvr>
+                                    </p:animEffect>
+                                  </p:childTnLst>
+                                </p:cTn>
+                              </p:par>
+                            </p:childTnLst>
+                          </p:cTn>
+                        </p:par>
+                      </p:childTnLst>
+                    </p:cTn>
+                  </p:par>
+                </p:childTnLst>
+              </p:cTn>
+              <p:prevCondLst>
+                <p:cond evt="onPrev" delay="0">
+                  <p:tgtEl>
+                    <p:sldTgt/>
+                  </p:tgtEl>
+                </p:cond>
+              </p:prevCondLst>
+              <p:nextCondLst>
+                <p:cond evt="onNext" delay="0">
+                  <p:tgtEl>
+                    <p:sldTgt/>
+                  </p:tgtEl>
+                </p:cond>
+              </p:nextCondLst>
+            </p:seq>
+          </p:childTnLst>
+        </p:cTn>
       </p:par>
     </p:tnLst>
   </p:timing>

</xml_diff>

<commit_message>
Màj du pptx de la soutenance finale
</commit_message>
<xml_diff>
--- a/doc/Présentations/Projet Courchevel - Soutenance finale.pptx
+++ b/doc/Présentations/Projet Courchevel - Soutenance finale.pptx
@@ -7506,7 +7506,7 @@
         </p:nvSpPr>
         <p:spPr>
           <a:xfrm>
-            <a:off x="3083070" y="5238258"/>
+            <a:off x="3538358" y="3861048"/>
             <a:ext cx="3697938" cy="1170243"/>
           </a:xfrm>
           <a:prstGeom prst="ellipse">
@@ -7624,7 +7624,7 @@
         <p:spPr>
           <a:xfrm>
             <a:off x="1965623" y="3721559"/>
-            <a:ext cx="1117447" cy="2101821"/>
+            <a:ext cx="1572735" cy="724611"/>
           </a:xfrm>
           <a:prstGeom prst="line">
             <a:avLst/>
@@ -7653,7 +7653,7 @@
         </p:nvSpPr>
         <p:spPr>
           <a:xfrm>
-            <a:off x="3659135" y="4149080"/>
+            <a:off x="3491880" y="5169390"/>
             <a:ext cx="3228738" cy="1008112"/>
           </a:xfrm>
           <a:prstGeom prst="ellipse">
@@ -7705,7 +7705,7 @@
         <p:spPr>
           <a:xfrm>
             <a:off x="1965623" y="3721559"/>
-            <a:ext cx="1693512" cy="931577"/>
+            <a:ext cx="1526257" cy="1951887"/>
           </a:xfrm>
           <a:prstGeom prst="line">
             <a:avLst/>
@@ -7965,7 +7965,7 @@
         </p:nvSpPr>
         <p:spPr>
           <a:xfrm>
-            <a:off x="3851920" y="3224994"/>
+            <a:off x="3779912" y="1960180"/>
             <a:ext cx="3496335" cy="1140110"/>
           </a:xfrm>
           <a:prstGeom prst="ellipse">
@@ -8009,7 +8009,7 @@
         </p:nvSpPr>
         <p:spPr>
           <a:xfrm>
-            <a:off x="3851920" y="4437112"/>
+            <a:off x="4355976" y="3239438"/>
             <a:ext cx="3456384" cy="1080120"/>
           </a:xfrm>
           <a:prstGeom prst="ellipse">
@@ -8053,7 +8053,7 @@
         </p:nvSpPr>
         <p:spPr>
           <a:xfrm>
-            <a:off x="3943561" y="1906918"/>
+            <a:off x="3779912" y="4437112"/>
             <a:ext cx="3697938" cy="1170243"/>
           </a:xfrm>
           <a:prstGeom prst="ellipse">
@@ -8099,9 +8099,9 @@
           <p:nvPr/>
         </p:nvCxnSpPr>
         <p:spPr>
-          <a:xfrm>
-            <a:off x="1349608" y="3616883"/>
-            <a:ext cx="2502312" cy="178166"/>
+          <a:xfrm flipV="1">
+            <a:off x="1349608" y="2530235"/>
+            <a:ext cx="2430304" cy="1086648"/>
           </a:xfrm>
           <a:prstGeom prst="line">
             <a:avLst/>
@@ -8134,7 +8134,7 @@
         <p:spPr>
           <a:xfrm>
             <a:off x="1349608" y="3616883"/>
-            <a:ext cx="2502312" cy="1360289"/>
+            <a:ext cx="3006368" cy="162615"/>
           </a:xfrm>
           <a:prstGeom prst="line">
             <a:avLst/>
@@ -8165,9 +8165,9 @@
           <p:nvPr/>
         </p:nvCxnSpPr>
         <p:spPr>
-          <a:xfrm flipV="1">
-            <a:off x="1349608" y="2492040"/>
-            <a:ext cx="2593953" cy="1124843"/>
+          <a:xfrm>
+            <a:off x="1349608" y="3616883"/>
+            <a:ext cx="2430304" cy="1405351"/>
           </a:xfrm>
           <a:prstGeom prst="line">
             <a:avLst/>
@@ -8302,12 +8302,8 @@
           <a:p>
             <a:pPr algn="ctr"/>
             <a:r>
-              <a:rPr lang="fr-FR" dirty="0"/>
-              <a:t>Faire une demande </a:t>
-            </a:r>
-            <a:r>
               <a:rPr lang="fr-FR" dirty="0" smtClean="0"/>
-              <a:t>groupée presse</a:t>
+              <a:t>Imprimer une accréditation</a:t>
             </a:r>
             <a:endParaRPr lang="fr-FR" dirty="0"/>
           </a:p>
@@ -8501,6 +8497,16 @@
         </p:nvPicPr>
         <p:blipFill>
           <a:blip r:embed="rId4">
+            <a:clrChange>
+              <a:clrFrom>
+                <a:srgbClr val="FFFFFF"/>
+              </a:clrFrom>
+              <a:clrTo>
+                <a:srgbClr val="FFFFFF">
+                  <a:alpha val="0"/>
+                </a:srgbClr>
+              </a:clrTo>
+            </a:clrChange>
             <a:extLst>
               <a:ext uri="{28A0092B-C50C-407E-A947-70E740481C1C}">
                 <a14:useLocalDpi xmlns:a14="http://schemas.microsoft.com/office/drawing/2010/main" val="0"/>
@@ -8514,8 +8520,8 @@
         </p:blipFill>
         <p:spPr bwMode="auto">
           <a:xfrm>
-            <a:off x="395536" y="927057"/>
-            <a:ext cx="8460000" cy="5526279"/>
+            <a:off x="432000" y="927056"/>
+            <a:ext cx="8542240" cy="5580000"/>
           </a:xfrm>
           <a:prstGeom prst="rect">
             <a:avLst/>
@@ -8687,6 +8693,16 @@
         </p:nvPicPr>
         <p:blipFill>
           <a:blip r:embed="rId4">
+            <a:clrChange>
+              <a:clrFrom>
+                <a:srgbClr val="FFFFFF"/>
+              </a:clrFrom>
+              <a:clrTo>
+                <a:srgbClr val="FFFFFF">
+                  <a:alpha val="0"/>
+                </a:srgbClr>
+              </a:clrTo>
+            </a:clrChange>
             <a:extLst>
               <a:ext uri="{28A0092B-C50C-407E-A947-70E740481C1C}">
                 <a14:useLocalDpi xmlns:a14="http://schemas.microsoft.com/office/drawing/2010/main" val="0"/>
@@ -8700,7 +8716,7 @@
         </p:blipFill>
         <p:spPr bwMode="auto">
           <a:xfrm>
-            <a:off x="395536" y="908719"/>
+            <a:off x="432000" y="928800"/>
             <a:ext cx="8542237" cy="5580000"/>
           </a:xfrm>
           <a:prstGeom prst="rect">
@@ -8873,6 +8889,16 @@
         </p:nvPicPr>
         <p:blipFill>
           <a:blip r:embed="rId4">
+            <a:clrChange>
+              <a:clrFrom>
+                <a:srgbClr val="FFFFFF"/>
+              </a:clrFrom>
+              <a:clrTo>
+                <a:srgbClr val="FFFFFF">
+                  <a:alpha val="0"/>
+                </a:srgbClr>
+              </a:clrTo>
+            </a:clrChange>
             <a:extLst>
               <a:ext uri="{28A0092B-C50C-407E-A947-70E740481C1C}">
                 <a14:useLocalDpi xmlns:a14="http://schemas.microsoft.com/office/drawing/2010/main" val="0"/>
@@ -8886,8 +8912,8 @@
         </p:blipFill>
         <p:spPr bwMode="auto">
           <a:xfrm>
-            <a:off x="432480" y="927055"/>
-            <a:ext cx="8460000" cy="5526281"/>
+            <a:off x="432480" y="927054"/>
+            <a:ext cx="8542237" cy="5580000"/>
           </a:xfrm>
           <a:prstGeom prst="rect">
             <a:avLst/>

</xml_diff>